<commit_message>
Update based on latest review
</commit_message>
<xml_diff>
--- a/presentation/Class_4_Dictionaries/Class_4_Dictionaries.pptx
+++ b/presentation/Class_4_Dictionaries/Class_4_Dictionaries.pptx
@@ -5,18 +5,20 @@
     <p:sldMasterId id="2147483660" r:id="rId1"/>
   </p:sldMasterIdLst>
   <p:notesMasterIdLst>
-    <p:notesMasterId r:id="rId11"/>
+    <p:notesMasterId r:id="rId13"/>
   </p:notesMasterIdLst>
   <p:sldIdLst>
     <p:sldId id="400" r:id="rId2"/>
     <p:sldId id="411" r:id="rId3"/>
     <p:sldId id="307" r:id="rId4"/>
-    <p:sldId id="393" r:id="rId5"/>
-    <p:sldId id="308" r:id="rId6"/>
-    <p:sldId id="409" r:id="rId7"/>
-    <p:sldId id="412" r:id="rId8"/>
-    <p:sldId id="413" r:id="rId9"/>
-    <p:sldId id="403" r:id="rId10"/>
+    <p:sldId id="414" r:id="rId5"/>
+    <p:sldId id="393" r:id="rId6"/>
+    <p:sldId id="308" r:id="rId7"/>
+    <p:sldId id="409" r:id="rId8"/>
+    <p:sldId id="412" r:id="rId9"/>
+    <p:sldId id="415" r:id="rId10"/>
+    <p:sldId id="413" r:id="rId11"/>
+    <p:sldId id="403" r:id="rId12"/>
   </p:sldIdLst>
   <p:sldSz cx="12192000" cy="6858000"/>
   <p:notesSz cx="6858000" cy="9144000"/>
@@ -205,7 +207,7 @@
           <a:p>
             <a:fld id="{7E78E4E2-C2CB-4D43-84EF-9F4E3E0E651C}" type="datetimeFigureOut">
               <a:rPr lang="en-US" smtClean="0"/>
-              <a:t>7/13/2022</a:t>
+              <a:t>8/9/2022</a:t>
             </a:fld>
             <a:endParaRPr lang="en-US" dirty="0"/>
           </a:p>
@@ -654,7 +656,7 @@
                 <a:tabLst/>
                 <a:defRPr/>
               </a:pPr>
-              <a:t>7/13/2022</a:t>
+              <a:t>8/9/2022</a:t>
             </a:fld>
             <a:endParaRPr kumimoji="0" lang="en-US" sz="1200" b="0" i="0" u="none" strike="noStrike" kern="1200" cap="none" spc="0" normalizeH="0" baseline="0" noProof="0" dirty="0">
               <a:ln>
@@ -994,7 +996,7 @@
                 <a:tabLst/>
                 <a:defRPr/>
               </a:pPr>
-              <a:t>7/13/2022</a:t>
+              <a:t>8/9/2022</a:t>
             </a:fld>
             <a:endParaRPr kumimoji="0" lang="en-US" sz="1200" b="0" i="0" u="none" strike="noStrike" kern="1200" cap="none" spc="0" normalizeH="0" baseline="0" noProof="0" dirty="0">
               <a:ln>
@@ -1328,350 +1330,7 @@
                 <a:tabLst/>
                 <a:defRPr/>
               </a:pPr>
-              <a:t>7/13/2022</a:t>
-            </a:fld>
-            <a:endParaRPr kumimoji="0" lang="en-US" sz="1200" b="0" i="0" u="none" strike="noStrike" kern="1200" cap="none" spc="0" normalizeH="0" baseline="0" noProof="0" dirty="0">
-              <a:ln>
-                <a:noFill/>
-              </a:ln>
-              <a:solidFill>
-                <a:prstClr val="black"/>
-              </a:solidFill>
-              <a:effectLst/>
-              <a:uLnTx/>
-              <a:uFillTx/>
-              <a:latin typeface="Calibri" panose="020F0502020204030204"/>
-              <a:ea typeface="+mn-ea"/>
-              <a:cs typeface="+mn-cs"/>
-            </a:endParaRPr>
-          </a:p>
-        </p:txBody>
-      </p:sp>
-      <p:sp>
-        <p:nvSpPr>
-          <p:cNvPr id="6" name="Footer Placeholder 5"/>
-          <p:cNvSpPr>
-            <a:spLocks noGrp="1"/>
-          </p:cNvSpPr>
-          <p:nvPr>
-            <p:ph type="ftr" sz="quarter" idx="12"/>
-          </p:nvPr>
-        </p:nvSpPr>
-        <p:spPr/>
-        <p:txBody>
-          <a:bodyPr/>
-          <a:lstStyle/>
-          <a:p>
-            <a:pPr marL="0" marR="0" lvl="0" indent="0" algn="l" defTabSz="457200" rtl="0" eaLnBrk="1" fontAlgn="auto" latinLnBrk="0" hangingPunct="1">
-              <a:lnSpc>
-                <a:spcPct val="100000"/>
-              </a:lnSpc>
-              <a:spcBef>
-                <a:spcPts val="0"/>
-              </a:spcBef>
-              <a:spcAft>
-                <a:spcPts val="0"/>
-              </a:spcAft>
-              <a:buClrTx/>
-              <a:buSzTx/>
-              <a:buFontTx/>
-              <a:buNone/>
-              <a:tabLst/>
-              <a:defRPr/>
-            </a:pPr>
-            <a:r>
-              <a:rPr kumimoji="0" lang="en-US" sz="1200" b="0" i="0" u="none" strike="noStrike" kern="1200" cap="none" spc="0" normalizeH="0" baseline="0" noProof="0" dirty="0">
-                <a:ln>
-                  <a:noFill/>
-                </a:ln>
-                <a:solidFill>
-                  <a:prstClr val="black"/>
-                </a:solidFill>
-                <a:effectLst/>
-                <a:uLnTx/>
-                <a:uFillTx/>
-                <a:latin typeface="Calibri" panose="020F0502020204030204"/>
-                <a:ea typeface="+mn-ea"/>
-                <a:cs typeface="+mn-cs"/>
-              </a:rPr>
-              <a:t>raysmith@alum.mit.edu</a:t>
-            </a:r>
-          </a:p>
-        </p:txBody>
-      </p:sp>
-      <p:sp>
-        <p:nvSpPr>
-          <p:cNvPr id="7" name="Slide Number Placeholder 6"/>
-          <p:cNvSpPr>
-            <a:spLocks noGrp="1"/>
-          </p:cNvSpPr>
-          <p:nvPr>
-            <p:ph type="sldNum" sz="quarter" idx="13"/>
-          </p:nvPr>
-        </p:nvSpPr>
-        <p:spPr/>
-        <p:txBody>
-          <a:bodyPr/>
-          <a:lstStyle/>
-          <a:p>
-            <a:pPr marL="0" marR="0" lvl="0" indent="0" algn="r" defTabSz="457200" rtl="0" eaLnBrk="1" fontAlgn="auto" latinLnBrk="0" hangingPunct="1">
-              <a:lnSpc>
-                <a:spcPct val="100000"/>
-              </a:lnSpc>
-              <a:spcBef>
-                <a:spcPts val="0"/>
-              </a:spcBef>
-              <a:spcAft>
-                <a:spcPts val="0"/>
-              </a:spcAft>
-              <a:buClrTx/>
-              <a:buSzTx/>
-              <a:buFontTx/>
-              <a:buNone/>
-              <a:tabLst/>
-              <a:defRPr/>
-            </a:pPr>
-            <a:fld id="{BA791329-992B-4F83-8435-C33B0EC26DB3}" type="slidenum">
-              <a:rPr kumimoji="0" lang="en-US" sz="1200" b="0" i="0" u="none" strike="noStrike" kern="1200" cap="none" spc="0" normalizeH="0" baseline="0" noProof="0" smtClean="0">
-                <a:ln>
-                  <a:noFill/>
-                </a:ln>
-                <a:solidFill>
-                  <a:prstClr val="black"/>
-                </a:solidFill>
-                <a:effectLst/>
-                <a:uLnTx/>
-                <a:uFillTx/>
-                <a:latin typeface="Calibri" panose="020F0502020204030204"/>
-                <a:ea typeface="+mn-ea"/>
-                <a:cs typeface="+mn-cs"/>
-              </a:rPr>
-              <a:pPr marL="0" marR="0" lvl="0" indent="0" algn="r" defTabSz="457200" rtl="0" eaLnBrk="1" fontAlgn="auto" latinLnBrk="0" hangingPunct="1">
-                <a:lnSpc>
-                  <a:spcPct val="100000"/>
-                </a:lnSpc>
-                <a:spcBef>
-                  <a:spcPts val="0"/>
-                </a:spcBef>
-                <a:spcAft>
-                  <a:spcPts val="0"/>
-                </a:spcAft>
-                <a:buClrTx/>
-                <a:buSzTx/>
-                <a:buFontTx/>
-                <a:buNone/>
-                <a:tabLst/>
-                <a:defRPr/>
-              </a:pPr>
-              <a:t>4</a:t>
-            </a:fld>
-            <a:endParaRPr kumimoji="0" lang="en-US" sz="1200" b="0" i="0" u="none" strike="noStrike" kern="1200" cap="none" spc="0" normalizeH="0" baseline="0" noProof="0" dirty="0">
-              <a:ln>
-                <a:noFill/>
-              </a:ln>
-              <a:solidFill>
-                <a:prstClr val="black"/>
-              </a:solidFill>
-              <a:effectLst/>
-              <a:uLnTx/>
-              <a:uFillTx/>
-              <a:latin typeface="Calibri" panose="020F0502020204030204"/>
-              <a:ea typeface="+mn-ea"/>
-              <a:cs typeface="+mn-cs"/>
-            </a:endParaRPr>
-          </a:p>
-        </p:txBody>
-      </p:sp>
-    </p:spTree>
-    <p:extLst>
-      <p:ext uri="{BB962C8B-B14F-4D97-AF65-F5344CB8AC3E}">
-        <p14:creationId xmlns:p14="http://schemas.microsoft.com/office/powerpoint/2010/main" val="897849005"/>
-      </p:ext>
-    </p:extLst>
-  </p:cSld>
-  <p:clrMapOvr>
-    <a:masterClrMapping/>
-  </p:clrMapOvr>
-</p:notes>
-</file>
-
-<file path=ppt/notesSlides/notesSlide4.xml><?xml version="1.0" encoding="utf-8"?>
-<p:notes xmlns:a="http://schemas.openxmlformats.org/drawingml/2006/main" xmlns:r="http://schemas.openxmlformats.org/officeDocument/2006/relationships" xmlns:p="http://schemas.openxmlformats.org/presentationml/2006/main">
-  <p:cSld>
-    <p:spTree>
-      <p:nvGrpSpPr>
-        <p:cNvPr id="1" name=""/>
-        <p:cNvGrpSpPr/>
-        <p:nvPr/>
-      </p:nvGrpSpPr>
-      <p:grpSpPr>
-        <a:xfrm>
-          <a:off x="0" y="0"/>
-          <a:ext cx="0" cy="0"/>
-          <a:chOff x="0" y="0"/>
-          <a:chExt cx="0" cy="0"/>
-        </a:xfrm>
-      </p:grpSpPr>
-      <p:sp>
-        <p:nvSpPr>
-          <p:cNvPr id="2" name="Slide Image Placeholder 1"/>
-          <p:cNvSpPr>
-            <a:spLocks noGrp="1" noRot="1" noChangeAspect="1"/>
-          </p:cNvSpPr>
-          <p:nvPr>
-            <p:ph type="sldImg"/>
-          </p:nvPr>
-        </p:nvSpPr>
-        <p:spPr/>
-      </p:sp>
-      <p:sp>
-        <p:nvSpPr>
-          <p:cNvPr id="3" name="Notes Placeholder 2"/>
-          <p:cNvSpPr>
-            <a:spLocks noGrp="1"/>
-          </p:cNvSpPr>
-          <p:nvPr>
-            <p:ph type="body" idx="1"/>
-          </p:nvPr>
-        </p:nvSpPr>
-        <p:spPr/>
-        <p:txBody>
-          <a:bodyPr/>
-          <a:lstStyle/>
-          <a:p>
-            <a:r>
-              <a:rPr lang="en-US" dirty="0"/>
-              <a:t>Dictionary constants (literals) start and end with {, } – curly brackets</a:t>
-            </a:r>
-          </a:p>
-          <a:p>
-            <a:r>
-              <a:rPr lang="en-US" dirty="0"/>
-              <a:t>A "dictionary" with only keys (no values) is a set. E.g. {"up", "down", "left", "right"}</a:t>
-            </a:r>
-          </a:p>
-          <a:p>
-            <a:endParaRPr lang="en-US" dirty="0"/>
-          </a:p>
-        </p:txBody>
-      </p:sp>
-      <p:sp>
-        <p:nvSpPr>
-          <p:cNvPr id="4" name="Header Placeholder 3"/>
-          <p:cNvSpPr>
-            <a:spLocks noGrp="1"/>
-          </p:cNvSpPr>
-          <p:nvPr>
-            <p:ph type="hdr" sz="quarter" idx="10"/>
-          </p:nvPr>
-        </p:nvSpPr>
-        <p:spPr/>
-        <p:txBody>
-          <a:bodyPr/>
-          <a:lstStyle/>
-          <a:p>
-            <a:pPr marL="0" marR="0" lvl="0" indent="0" algn="l" defTabSz="457200" rtl="0" eaLnBrk="1" fontAlgn="auto" latinLnBrk="0" hangingPunct="1">
-              <a:lnSpc>
-                <a:spcPct val="100000"/>
-              </a:lnSpc>
-              <a:spcBef>
-                <a:spcPts val="0"/>
-              </a:spcBef>
-              <a:spcAft>
-                <a:spcPts val="0"/>
-              </a:spcAft>
-              <a:buClrTx/>
-              <a:buSzTx/>
-              <a:buFontTx/>
-              <a:buNone/>
-              <a:tabLst/>
-              <a:defRPr/>
-            </a:pPr>
-            <a:r>
-              <a:rPr kumimoji="0" lang="en-US" sz="1200" b="0" i="0" u="none" strike="noStrike" kern="1200" cap="none" spc="0" normalizeH="0" baseline="0" noProof="0" dirty="0">
-                <a:ln>
-                  <a:noFill/>
-                </a:ln>
-                <a:solidFill>
-                  <a:prstClr val="black"/>
-                </a:solidFill>
-                <a:effectLst/>
-                <a:uLnTx/>
-                <a:uFillTx/>
-                <a:latin typeface="Calibri" panose="020F0502020204030204"/>
-                <a:ea typeface="+mn-ea"/>
-                <a:cs typeface="+mn-cs"/>
-              </a:rPr>
-              <a:t>Introduction to Programming using Python</a:t>
-            </a:r>
-          </a:p>
-        </p:txBody>
-      </p:sp>
-      <p:sp>
-        <p:nvSpPr>
-          <p:cNvPr id="5" name="Date Placeholder 4"/>
-          <p:cNvSpPr>
-            <a:spLocks noGrp="1"/>
-          </p:cNvSpPr>
-          <p:nvPr>
-            <p:ph type="dt" idx="11"/>
-          </p:nvPr>
-        </p:nvSpPr>
-        <p:spPr/>
-        <p:txBody>
-          <a:bodyPr/>
-          <a:lstStyle/>
-          <a:p>
-            <a:pPr marL="0" marR="0" lvl="0" indent="0" algn="r" defTabSz="457200" rtl="0" eaLnBrk="1" fontAlgn="auto" latinLnBrk="0" hangingPunct="1">
-              <a:lnSpc>
-                <a:spcPct val="100000"/>
-              </a:lnSpc>
-              <a:spcBef>
-                <a:spcPts val="0"/>
-              </a:spcBef>
-              <a:spcAft>
-                <a:spcPts val="0"/>
-              </a:spcAft>
-              <a:buClrTx/>
-              <a:buSzTx/>
-              <a:buFontTx/>
-              <a:buNone/>
-              <a:tabLst/>
-              <a:defRPr/>
-            </a:pPr>
-            <a:fld id="{A596092B-28C7-44D1-B902-5437B333DFB7}" type="datetime1">
-              <a:rPr kumimoji="0" lang="en-US" sz="1200" b="0" i="0" u="none" strike="noStrike" kern="1200" cap="none" spc="0" normalizeH="0" baseline="0" noProof="0" smtClean="0">
-                <a:ln>
-                  <a:noFill/>
-                </a:ln>
-                <a:solidFill>
-                  <a:prstClr val="black"/>
-                </a:solidFill>
-                <a:effectLst/>
-                <a:uLnTx/>
-                <a:uFillTx/>
-                <a:latin typeface="Calibri" panose="020F0502020204030204"/>
-                <a:ea typeface="+mn-ea"/>
-                <a:cs typeface="+mn-cs"/>
-              </a:rPr>
-              <a:pPr marL="0" marR="0" lvl="0" indent="0" algn="r" defTabSz="457200" rtl="0" eaLnBrk="1" fontAlgn="auto" latinLnBrk="0" hangingPunct="1">
-                <a:lnSpc>
-                  <a:spcPct val="100000"/>
-                </a:lnSpc>
-                <a:spcBef>
-                  <a:spcPts val="0"/>
-                </a:spcBef>
-                <a:spcAft>
-                  <a:spcPts val="0"/>
-                </a:spcAft>
-                <a:buClrTx/>
-                <a:buSzTx/>
-                <a:buFontTx/>
-                <a:buNone/>
-                <a:tabLst/>
-                <a:defRPr/>
-              </a:pPr>
-              <a:t>7/13/2022</a:t>
+              <a:t>8/9/2022</a:t>
             </a:fld>
             <a:endParaRPr kumimoji="0" lang="en-US" sz="1200" b="0" i="0" u="none" strike="noStrike" kern="1200" cap="none" spc="0" normalizeH="0" baseline="0" noProof="0" dirty="0">
               <a:ln>
@@ -1828,7 +1487,7 @@
     </p:spTree>
     <p:extLst>
       <p:ext uri="{BB962C8B-B14F-4D97-AF65-F5344CB8AC3E}">
-        <p14:creationId xmlns:p14="http://schemas.microsoft.com/office/powerpoint/2010/main" val="1662508237"/>
+        <p14:creationId xmlns:p14="http://schemas.microsoft.com/office/powerpoint/2010/main" val="897849005"/>
       </p:ext>
     </p:extLst>
   </p:cSld>
@@ -1838,7 +1497,7 @@
 </p:notes>
 </file>
 
-<file path=ppt/notesSlides/notesSlide5.xml><?xml version="1.0" encoding="utf-8"?>
+<file path=ppt/notesSlides/notesSlide4.xml><?xml version="1.0" encoding="utf-8"?>
 <p:notes xmlns:a="http://schemas.openxmlformats.org/drawingml/2006/main" xmlns:r="http://schemas.openxmlformats.org/officeDocument/2006/relationships" xmlns:p="http://schemas.openxmlformats.org/presentationml/2006/main">
   <p:cSld>
     <p:spTree>
@@ -1884,8 +1543,17 @@
           <a:p>
             <a:r>
               <a:rPr lang="en-US" dirty="0"/>
-              <a:t>If only keys, i</a:t>
-            </a:r>
+              <a:t>Dictionary constants (literals) start and end with {, } – curly brackets</a:t>
+            </a:r>
+          </a:p>
+          <a:p>
+            <a:r>
+              <a:rPr lang="en-US" dirty="0"/>
+              <a:t>A "dictionary" with only keys (no values) is a set. E.g. {"up", "down", "left", "right"}</a:t>
+            </a:r>
+          </a:p>
+          <a:p>
+            <a:endParaRPr lang="en-US" dirty="0"/>
           </a:p>
         </p:txBody>
       </p:sp>
@@ -2005,7 +1673,7 @@
                 <a:tabLst/>
                 <a:defRPr/>
               </a:pPr>
-              <a:t>7/13/2022</a:t>
+              <a:t>8/9/2022</a:t>
             </a:fld>
             <a:endParaRPr kumimoji="0" lang="en-US" sz="1200" b="0" i="0" u="none" strike="noStrike" kern="1200" cap="none" spc="0" normalizeH="0" baseline="0" noProof="0" dirty="0">
               <a:ln>
@@ -2162,7 +1830,7 @@
     </p:spTree>
     <p:extLst>
       <p:ext uri="{BB962C8B-B14F-4D97-AF65-F5344CB8AC3E}">
-        <p14:creationId xmlns:p14="http://schemas.microsoft.com/office/powerpoint/2010/main" val="1004328960"/>
+        <p14:creationId xmlns:p14="http://schemas.microsoft.com/office/powerpoint/2010/main" val="1662508237"/>
       </p:ext>
     </p:extLst>
   </p:cSld>
@@ -2172,7 +1840,7 @@
 </p:notes>
 </file>
 
-<file path=ppt/notesSlides/notesSlide6.xml><?xml version="1.0" encoding="utf-8"?>
+<file path=ppt/notesSlides/notesSlide5.xml><?xml version="1.0" encoding="utf-8"?>
 <p:notes xmlns:a="http://schemas.openxmlformats.org/drawingml/2006/main" xmlns:r="http://schemas.openxmlformats.org/officeDocument/2006/relationships" xmlns:p="http://schemas.openxmlformats.org/presentationml/2006/main">
   <p:cSld>
     <p:spTree>
@@ -2218,13 +1886,7 @@
           <a:p>
             <a:r>
               <a:rPr lang="en-US" dirty="0"/>
-              <a:t>A "dictionary" with only keys (no values) is a set.</a:t>
-            </a:r>
-          </a:p>
-          <a:p>
-            <a:r>
-              <a:rPr lang="en-US" dirty="0"/>
-              <a:t>What improvements could you make? In input? In motion? In goals?</a:t>
+              <a:t>If only keys, i</a:t>
             </a:r>
           </a:p>
         </p:txBody>
@@ -2345,7 +2007,7 @@
                 <a:tabLst/>
                 <a:defRPr/>
               </a:pPr>
-              <a:t>7/13/2022</a:t>
+              <a:t>8/9/2022</a:t>
             </a:fld>
             <a:endParaRPr kumimoji="0" lang="en-US" sz="1200" b="0" i="0" u="none" strike="noStrike" kern="1200" cap="none" spc="0" normalizeH="0" baseline="0" noProof="0" dirty="0">
               <a:ln>
@@ -2502,6 +2164,346 @@
     </p:spTree>
     <p:extLst>
       <p:ext uri="{BB962C8B-B14F-4D97-AF65-F5344CB8AC3E}">
+        <p14:creationId xmlns:p14="http://schemas.microsoft.com/office/powerpoint/2010/main" val="1004328960"/>
+      </p:ext>
+    </p:extLst>
+  </p:cSld>
+  <p:clrMapOvr>
+    <a:masterClrMapping/>
+  </p:clrMapOvr>
+</p:notes>
+</file>
+
+<file path=ppt/notesSlides/notesSlide6.xml><?xml version="1.0" encoding="utf-8"?>
+<p:notes xmlns:a="http://schemas.openxmlformats.org/drawingml/2006/main" xmlns:r="http://schemas.openxmlformats.org/officeDocument/2006/relationships" xmlns:p="http://schemas.openxmlformats.org/presentationml/2006/main">
+  <p:cSld>
+    <p:spTree>
+      <p:nvGrpSpPr>
+        <p:cNvPr id="1" name=""/>
+        <p:cNvGrpSpPr/>
+        <p:nvPr/>
+      </p:nvGrpSpPr>
+      <p:grpSpPr>
+        <a:xfrm>
+          <a:off x="0" y="0"/>
+          <a:ext cx="0" cy="0"/>
+          <a:chOff x="0" y="0"/>
+          <a:chExt cx="0" cy="0"/>
+        </a:xfrm>
+      </p:grpSpPr>
+      <p:sp>
+        <p:nvSpPr>
+          <p:cNvPr id="2" name="Slide Image Placeholder 1"/>
+          <p:cNvSpPr>
+            <a:spLocks noGrp="1" noRot="1" noChangeAspect="1"/>
+          </p:cNvSpPr>
+          <p:nvPr>
+            <p:ph type="sldImg"/>
+          </p:nvPr>
+        </p:nvSpPr>
+        <p:spPr/>
+      </p:sp>
+      <p:sp>
+        <p:nvSpPr>
+          <p:cNvPr id="3" name="Notes Placeholder 2"/>
+          <p:cNvSpPr>
+            <a:spLocks noGrp="1"/>
+          </p:cNvSpPr>
+          <p:nvPr>
+            <p:ph type="body" idx="1"/>
+          </p:nvPr>
+        </p:nvSpPr>
+        <p:spPr/>
+        <p:txBody>
+          <a:bodyPr/>
+          <a:lstStyle/>
+          <a:p>
+            <a:r>
+              <a:rPr lang="en-US" dirty="0"/>
+              <a:t>A "dictionary" with only keys (no values) is a set.</a:t>
+            </a:r>
+          </a:p>
+          <a:p>
+            <a:r>
+              <a:rPr lang="en-US" dirty="0"/>
+              <a:t>What improvements could you make? In input? In motion? In goals?</a:t>
+            </a:r>
+          </a:p>
+        </p:txBody>
+      </p:sp>
+      <p:sp>
+        <p:nvSpPr>
+          <p:cNvPr id="4" name="Header Placeholder 3"/>
+          <p:cNvSpPr>
+            <a:spLocks noGrp="1"/>
+          </p:cNvSpPr>
+          <p:nvPr>
+            <p:ph type="hdr" sz="quarter" idx="10"/>
+          </p:nvPr>
+        </p:nvSpPr>
+        <p:spPr/>
+        <p:txBody>
+          <a:bodyPr/>
+          <a:lstStyle/>
+          <a:p>
+            <a:pPr marL="0" marR="0" lvl="0" indent="0" algn="l" defTabSz="457200" rtl="0" eaLnBrk="1" fontAlgn="auto" latinLnBrk="0" hangingPunct="1">
+              <a:lnSpc>
+                <a:spcPct val="100000"/>
+              </a:lnSpc>
+              <a:spcBef>
+                <a:spcPts val="0"/>
+              </a:spcBef>
+              <a:spcAft>
+                <a:spcPts val="0"/>
+              </a:spcAft>
+              <a:buClrTx/>
+              <a:buSzTx/>
+              <a:buFontTx/>
+              <a:buNone/>
+              <a:tabLst/>
+              <a:defRPr/>
+            </a:pPr>
+            <a:r>
+              <a:rPr kumimoji="0" lang="en-US" sz="1200" b="0" i="0" u="none" strike="noStrike" kern="1200" cap="none" spc="0" normalizeH="0" baseline="0" noProof="0" dirty="0">
+                <a:ln>
+                  <a:noFill/>
+                </a:ln>
+                <a:solidFill>
+                  <a:prstClr val="black"/>
+                </a:solidFill>
+                <a:effectLst/>
+                <a:uLnTx/>
+                <a:uFillTx/>
+                <a:latin typeface="Calibri" panose="020F0502020204030204"/>
+                <a:ea typeface="+mn-ea"/>
+                <a:cs typeface="+mn-cs"/>
+              </a:rPr>
+              <a:t>Introduction to Programming using Python</a:t>
+            </a:r>
+          </a:p>
+        </p:txBody>
+      </p:sp>
+      <p:sp>
+        <p:nvSpPr>
+          <p:cNvPr id="5" name="Date Placeholder 4"/>
+          <p:cNvSpPr>
+            <a:spLocks noGrp="1"/>
+          </p:cNvSpPr>
+          <p:nvPr>
+            <p:ph type="dt" idx="11"/>
+          </p:nvPr>
+        </p:nvSpPr>
+        <p:spPr/>
+        <p:txBody>
+          <a:bodyPr/>
+          <a:lstStyle/>
+          <a:p>
+            <a:pPr marL="0" marR="0" lvl="0" indent="0" algn="r" defTabSz="457200" rtl="0" eaLnBrk="1" fontAlgn="auto" latinLnBrk="0" hangingPunct="1">
+              <a:lnSpc>
+                <a:spcPct val="100000"/>
+              </a:lnSpc>
+              <a:spcBef>
+                <a:spcPts val="0"/>
+              </a:spcBef>
+              <a:spcAft>
+                <a:spcPts val="0"/>
+              </a:spcAft>
+              <a:buClrTx/>
+              <a:buSzTx/>
+              <a:buFontTx/>
+              <a:buNone/>
+              <a:tabLst/>
+              <a:defRPr/>
+            </a:pPr>
+            <a:fld id="{A596092B-28C7-44D1-B902-5437B333DFB7}" type="datetime1">
+              <a:rPr kumimoji="0" lang="en-US" sz="1200" b="0" i="0" u="none" strike="noStrike" kern="1200" cap="none" spc="0" normalizeH="0" baseline="0" noProof="0" smtClean="0">
+                <a:ln>
+                  <a:noFill/>
+                </a:ln>
+                <a:solidFill>
+                  <a:prstClr val="black"/>
+                </a:solidFill>
+                <a:effectLst/>
+                <a:uLnTx/>
+                <a:uFillTx/>
+                <a:latin typeface="Calibri" panose="020F0502020204030204"/>
+                <a:ea typeface="+mn-ea"/>
+                <a:cs typeface="+mn-cs"/>
+              </a:rPr>
+              <a:pPr marL="0" marR="0" lvl="0" indent="0" algn="r" defTabSz="457200" rtl="0" eaLnBrk="1" fontAlgn="auto" latinLnBrk="0" hangingPunct="1">
+                <a:lnSpc>
+                  <a:spcPct val="100000"/>
+                </a:lnSpc>
+                <a:spcBef>
+                  <a:spcPts val="0"/>
+                </a:spcBef>
+                <a:spcAft>
+                  <a:spcPts val="0"/>
+                </a:spcAft>
+                <a:buClrTx/>
+                <a:buSzTx/>
+                <a:buFontTx/>
+                <a:buNone/>
+                <a:tabLst/>
+                <a:defRPr/>
+              </a:pPr>
+              <a:t>8/9/2022</a:t>
+            </a:fld>
+            <a:endParaRPr kumimoji="0" lang="en-US" sz="1200" b="0" i="0" u="none" strike="noStrike" kern="1200" cap="none" spc="0" normalizeH="0" baseline="0" noProof="0" dirty="0">
+              <a:ln>
+                <a:noFill/>
+              </a:ln>
+              <a:solidFill>
+                <a:prstClr val="black"/>
+              </a:solidFill>
+              <a:effectLst/>
+              <a:uLnTx/>
+              <a:uFillTx/>
+              <a:latin typeface="Calibri" panose="020F0502020204030204"/>
+              <a:ea typeface="+mn-ea"/>
+              <a:cs typeface="+mn-cs"/>
+            </a:endParaRPr>
+          </a:p>
+        </p:txBody>
+      </p:sp>
+      <p:sp>
+        <p:nvSpPr>
+          <p:cNvPr id="6" name="Footer Placeholder 5"/>
+          <p:cNvSpPr>
+            <a:spLocks noGrp="1"/>
+          </p:cNvSpPr>
+          <p:nvPr>
+            <p:ph type="ftr" sz="quarter" idx="12"/>
+          </p:nvPr>
+        </p:nvSpPr>
+        <p:spPr/>
+        <p:txBody>
+          <a:bodyPr/>
+          <a:lstStyle/>
+          <a:p>
+            <a:pPr marL="0" marR="0" lvl="0" indent="0" algn="l" defTabSz="457200" rtl="0" eaLnBrk="1" fontAlgn="auto" latinLnBrk="0" hangingPunct="1">
+              <a:lnSpc>
+                <a:spcPct val="100000"/>
+              </a:lnSpc>
+              <a:spcBef>
+                <a:spcPts val="0"/>
+              </a:spcBef>
+              <a:spcAft>
+                <a:spcPts val="0"/>
+              </a:spcAft>
+              <a:buClrTx/>
+              <a:buSzTx/>
+              <a:buFontTx/>
+              <a:buNone/>
+              <a:tabLst/>
+              <a:defRPr/>
+            </a:pPr>
+            <a:r>
+              <a:rPr kumimoji="0" lang="en-US" sz="1200" b="0" i="0" u="none" strike="noStrike" kern="1200" cap="none" spc="0" normalizeH="0" baseline="0" noProof="0" dirty="0">
+                <a:ln>
+                  <a:noFill/>
+                </a:ln>
+                <a:solidFill>
+                  <a:prstClr val="black"/>
+                </a:solidFill>
+                <a:effectLst/>
+                <a:uLnTx/>
+                <a:uFillTx/>
+                <a:latin typeface="Calibri" panose="020F0502020204030204"/>
+                <a:ea typeface="+mn-ea"/>
+                <a:cs typeface="+mn-cs"/>
+              </a:rPr>
+              <a:t>raysmith@alum.mit.edu</a:t>
+            </a:r>
+          </a:p>
+        </p:txBody>
+      </p:sp>
+      <p:sp>
+        <p:nvSpPr>
+          <p:cNvPr id="7" name="Slide Number Placeholder 6"/>
+          <p:cNvSpPr>
+            <a:spLocks noGrp="1"/>
+          </p:cNvSpPr>
+          <p:nvPr>
+            <p:ph type="sldNum" sz="quarter" idx="13"/>
+          </p:nvPr>
+        </p:nvSpPr>
+        <p:spPr/>
+        <p:txBody>
+          <a:bodyPr/>
+          <a:lstStyle/>
+          <a:p>
+            <a:pPr marL="0" marR="0" lvl="0" indent="0" algn="r" defTabSz="457200" rtl="0" eaLnBrk="1" fontAlgn="auto" latinLnBrk="0" hangingPunct="1">
+              <a:lnSpc>
+                <a:spcPct val="100000"/>
+              </a:lnSpc>
+              <a:spcBef>
+                <a:spcPts val="0"/>
+              </a:spcBef>
+              <a:spcAft>
+                <a:spcPts val="0"/>
+              </a:spcAft>
+              <a:buClrTx/>
+              <a:buSzTx/>
+              <a:buFontTx/>
+              <a:buNone/>
+              <a:tabLst/>
+              <a:defRPr/>
+            </a:pPr>
+            <a:fld id="{BA791329-992B-4F83-8435-C33B0EC26DB3}" type="slidenum">
+              <a:rPr kumimoji="0" lang="en-US" sz="1200" b="0" i="0" u="none" strike="noStrike" kern="1200" cap="none" spc="0" normalizeH="0" baseline="0" noProof="0" smtClean="0">
+                <a:ln>
+                  <a:noFill/>
+                </a:ln>
+                <a:solidFill>
+                  <a:prstClr val="black"/>
+                </a:solidFill>
+                <a:effectLst/>
+                <a:uLnTx/>
+                <a:uFillTx/>
+                <a:latin typeface="Calibri" panose="020F0502020204030204"/>
+                <a:ea typeface="+mn-ea"/>
+                <a:cs typeface="+mn-cs"/>
+              </a:rPr>
+              <a:pPr marL="0" marR="0" lvl="0" indent="0" algn="r" defTabSz="457200" rtl="0" eaLnBrk="1" fontAlgn="auto" latinLnBrk="0" hangingPunct="1">
+                <a:lnSpc>
+                  <a:spcPct val="100000"/>
+                </a:lnSpc>
+                <a:spcBef>
+                  <a:spcPts val="0"/>
+                </a:spcBef>
+                <a:spcAft>
+                  <a:spcPts val="0"/>
+                </a:spcAft>
+                <a:buClrTx/>
+                <a:buSzTx/>
+                <a:buFontTx/>
+                <a:buNone/>
+                <a:tabLst/>
+                <a:defRPr/>
+              </a:pPr>
+              <a:t>8</a:t>
+            </a:fld>
+            <a:endParaRPr kumimoji="0" lang="en-US" sz="1200" b="0" i="0" u="none" strike="noStrike" kern="1200" cap="none" spc="0" normalizeH="0" baseline="0" noProof="0" dirty="0">
+              <a:ln>
+                <a:noFill/>
+              </a:ln>
+              <a:solidFill>
+                <a:prstClr val="black"/>
+              </a:solidFill>
+              <a:effectLst/>
+              <a:uLnTx/>
+              <a:uFillTx/>
+              <a:latin typeface="Calibri" panose="020F0502020204030204"/>
+              <a:ea typeface="+mn-ea"/>
+              <a:cs typeface="+mn-cs"/>
+            </a:endParaRPr>
+          </a:p>
+        </p:txBody>
+      </p:sp>
+    </p:spTree>
+    <p:extLst>
+      <p:ext uri="{BB962C8B-B14F-4D97-AF65-F5344CB8AC3E}">
         <p14:creationId xmlns:p14="http://schemas.microsoft.com/office/powerpoint/2010/main" val="2224878559"/>
       </p:ext>
     </p:extLst>
@@ -2617,7 +2619,7 @@
           <a:p>
             <a:fld id="{A596092B-28C7-44D1-B902-5437B333DFB7}" type="datetime1">
               <a:rPr lang="en-US" smtClean="0"/>
-              <a:t>7/13/2022</a:t>
+              <a:t>8/9/2022</a:t>
             </a:fld>
             <a:endParaRPr lang="en-US" dirty="0"/>
           </a:p>
@@ -2662,7 +2664,7 @@
           <a:p>
             <a:fld id="{BA791329-992B-4F83-8435-C33B0EC26DB3}" type="slidenum">
               <a:rPr lang="en-US" smtClean="0"/>
-              <a:t>9</a:t>
+              <a:t>11</a:t>
             </a:fld>
             <a:endParaRPr lang="en-US" dirty="0"/>
           </a:p>
@@ -3403,7 +3405,7 @@
           <a:p>
             <a:fld id="{B1DF5501-EE91-4443-9D3B-24E6F28D34E2}" type="datetime1">
               <a:rPr lang="en-US" smtClean="0"/>
-              <a:t>7/13/2022</a:t>
+              <a:t>8/9/2022</a:t>
             </a:fld>
             <a:endParaRPr lang="en-US" dirty="0"/>
           </a:p>
@@ -3669,7 +3671,7 @@
           <a:p>
             <a:fld id="{E954E1E9-8456-43AD-BA28-861520D256B9}" type="datetime1">
               <a:rPr lang="en-US" smtClean="0"/>
-              <a:t>7/13/2022</a:t>
+              <a:t>8/9/2022</a:t>
             </a:fld>
             <a:endParaRPr lang="en-US" dirty="0"/>
           </a:p>
@@ -3987,7 +3989,7 @@
           <a:p>
             <a:fld id="{FAF31E0C-AAFD-4E63-B3AE-16CD757951F4}" type="datetime1">
               <a:rPr lang="en-US" smtClean="0"/>
-              <a:t>7/13/2022</a:t>
+              <a:t>8/9/2022</a:t>
             </a:fld>
             <a:endParaRPr lang="en-US" dirty="0"/>
           </a:p>
@@ -4332,7 +4334,7 @@
           <a:p>
             <a:fld id="{000084FF-4715-4B6E-BD22-453621E5873F}" type="datetime1">
               <a:rPr lang="en-US" smtClean="0"/>
-              <a:t>7/13/2022</a:t>
+              <a:t>8/9/2022</a:t>
             </a:fld>
             <a:endParaRPr lang="en-US" dirty="0"/>
           </a:p>
@@ -4650,7 +4652,7 @@
           <a:p>
             <a:fld id="{6AC37F8D-4DF5-4AB6-A766-5A84B3D74A3B}" type="datetime1">
               <a:rPr lang="en-US" smtClean="0"/>
-              <a:t>7/13/2022</a:t>
+              <a:t>8/9/2022</a:t>
             </a:fld>
             <a:endParaRPr lang="en-US" dirty="0"/>
           </a:p>
@@ -5047,7 +5049,7 @@
           <a:p>
             <a:fld id="{1BF3CD1A-162D-40B2-9B22-9056F77C27F2}" type="datetime1">
               <a:rPr lang="en-US" smtClean="0"/>
-              <a:t>7/13/2022</a:t>
+              <a:t>8/9/2022</a:t>
             </a:fld>
             <a:endParaRPr lang="en-US" dirty="0"/>
           </a:p>
@@ -5221,7 +5223,7 @@
           <a:p>
             <a:fld id="{D42E4200-B1E5-4E39-8279-05DD69810A37}" type="datetime1">
               <a:rPr lang="en-US" smtClean="0"/>
-              <a:t>7/13/2022</a:t>
+              <a:t>8/9/2022</a:t>
             </a:fld>
             <a:endParaRPr lang="en-US" dirty="0"/>
           </a:p>
@@ -5404,7 +5406,7 @@
           <a:p>
             <a:fld id="{47CF7895-00AC-42E5-9790-7B0E3CE09DF2}" type="datetime1">
               <a:rPr lang="en-US" smtClean="0"/>
-              <a:t>7/13/2022</a:t>
+              <a:t>8/9/2022</a:t>
             </a:fld>
             <a:endParaRPr lang="en-US" dirty="0"/>
           </a:p>
@@ -5583,7 +5585,7 @@
           <a:p>
             <a:fld id="{A7119916-CD40-456D-ABE3-55F8822671F7}" type="datetime1">
               <a:rPr lang="en-US" smtClean="0"/>
-              <a:t>7/13/2022</a:t>
+              <a:t>8/9/2022</a:t>
             </a:fld>
             <a:endParaRPr lang="en-US" dirty="0"/>
           </a:p>
@@ -5833,7 +5835,7 @@
           <a:p>
             <a:fld id="{3F9A13D6-B8C2-463B-B3F7-C62E098B328E}" type="datetime1">
               <a:rPr lang="en-US" smtClean="0"/>
-              <a:t>7/13/2022</a:t>
+              <a:t>8/9/2022</a:t>
             </a:fld>
             <a:endParaRPr lang="en-US" dirty="0"/>
           </a:p>
@@ -6068,7 +6070,7 @@
           <a:p>
             <a:fld id="{D2B63420-31EE-4E4B-911C-2601B14D9FDD}" type="datetime1">
               <a:rPr lang="en-US" smtClean="0"/>
-              <a:t>7/13/2022</a:t>
+              <a:t>8/9/2022</a:t>
             </a:fld>
             <a:endParaRPr lang="en-US" dirty="0"/>
           </a:p>
@@ -6445,7 +6447,7 @@
           <a:p>
             <a:fld id="{2DD8986D-86F8-41E6-8CFF-8C91AEF92622}" type="datetime1">
               <a:rPr lang="en-US" smtClean="0"/>
-              <a:t>7/13/2022</a:t>
+              <a:t>8/9/2022</a:t>
             </a:fld>
             <a:endParaRPr lang="en-US" dirty="0"/>
           </a:p>
@@ -6571,7 +6573,7 @@
           <a:p>
             <a:fld id="{BA885161-032E-4C6A-8EDA-39D168DF18E4}" type="datetime1">
               <a:rPr lang="en-US" smtClean="0"/>
-              <a:t>7/13/2022</a:t>
+              <a:t>8/9/2022</a:t>
             </a:fld>
             <a:endParaRPr lang="en-US" dirty="0"/>
           </a:p>
@@ -6669,7 +6671,7 @@
           <a:p>
             <a:fld id="{958E6740-E523-48D9-9C4E-6F218E87BAF3}" type="datetime1">
               <a:rPr lang="en-US" smtClean="0"/>
-              <a:t>7/13/2022</a:t>
+              <a:t>8/9/2022</a:t>
             </a:fld>
             <a:endParaRPr lang="en-US" dirty="0"/>
           </a:p>
@@ -6927,7 +6929,7 @@
           <a:p>
             <a:fld id="{6121D4CA-FF09-4CB8-8D51-2613D19A0F2E}" type="datetime1">
               <a:rPr lang="en-US" smtClean="0"/>
-              <a:t>7/13/2022</a:t>
+              <a:t>8/9/2022</a:t>
             </a:fld>
             <a:endParaRPr lang="en-US" dirty="0"/>
           </a:p>
@@ -7192,7 +7194,7 @@
           <a:p>
             <a:fld id="{8C4779EA-AEA7-43B3-9B65-A77E9A890421}" type="datetime1">
               <a:rPr lang="en-US" smtClean="0"/>
-              <a:t>7/13/2022</a:t>
+              <a:t>8/9/2022</a:t>
             </a:fld>
             <a:endParaRPr lang="en-US" dirty="0"/>
           </a:p>
@@ -7938,7 +7940,7 @@
           <a:p>
             <a:fld id="{059A67F1-3EA0-4026-BE6A-31EE4E1B1DB5}" type="datetime1">
               <a:rPr lang="en-US" smtClean="0"/>
-              <a:t>7/13/2022</a:t>
+              <a:t>8/9/2022</a:t>
             </a:fld>
             <a:endParaRPr lang="en-US" dirty="0"/>
           </a:p>
@@ -8673,7 +8675,7 @@
                 <a:tabLst/>
                 <a:defRPr/>
               </a:pPr>
-              <a:t>7/13/2022</a:t>
+              <a:t>8/9/2022</a:t>
             </a:fld>
             <a:endParaRPr kumimoji="0" lang="en-US" sz="900" b="0" i="0" u="none" strike="noStrike" kern="1200" cap="none" spc="0" normalizeH="0" baseline="0" noProof="0" dirty="0">
               <a:ln>
@@ -8893,6 +8895,447 @@
 </p:sld>
 </file>
 
+<file path=ppt/slides/slide10.xml><?xml version="1.0" encoding="utf-8"?>
+<p:sld xmlns:a="http://schemas.openxmlformats.org/drawingml/2006/main" xmlns:r="http://schemas.openxmlformats.org/officeDocument/2006/relationships" xmlns:p="http://schemas.openxmlformats.org/presentationml/2006/main">
+  <p:cSld>
+    <p:spTree>
+      <p:nvGrpSpPr>
+        <p:cNvPr id="1" name=""/>
+        <p:cNvGrpSpPr/>
+        <p:nvPr/>
+      </p:nvGrpSpPr>
+      <p:grpSpPr>
+        <a:xfrm>
+          <a:off x="0" y="0"/>
+          <a:ext cx="0" cy="0"/>
+          <a:chOff x="0" y="0"/>
+          <a:chExt cx="0" cy="0"/>
+        </a:xfrm>
+      </p:grpSpPr>
+      <p:sp>
+        <p:nvSpPr>
+          <p:cNvPr id="2" name="Title 1">
+            <a:extLst>
+              <a:ext uri="{FF2B5EF4-FFF2-40B4-BE49-F238E27FC236}">
+                <a16:creationId xmlns:a16="http://schemas.microsoft.com/office/drawing/2014/main" id="{8E8C36EC-DEF9-429E-AF7C-077A23A7A195}"/>
+              </a:ext>
+            </a:extLst>
+          </p:cNvPr>
+          <p:cNvSpPr>
+            <a:spLocks noGrp="1"/>
+          </p:cNvSpPr>
+          <p:nvPr>
+            <p:ph type="title"/>
+          </p:nvPr>
+        </p:nvSpPr>
+        <p:spPr/>
+        <p:txBody>
+          <a:bodyPr/>
+          <a:lstStyle/>
+          <a:p>
+            <a:r>
+              <a:rPr lang="en-US" dirty="0"/>
+              <a:t>Review Dictionary in use Example</a:t>
+            </a:r>
+          </a:p>
+        </p:txBody>
+      </p:sp>
+      <p:sp>
+        <p:nvSpPr>
+          <p:cNvPr id="3" name="Content Placeholder 2">
+            <a:extLst>
+              <a:ext uri="{FF2B5EF4-FFF2-40B4-BE49-F238E27FC236}">
+                <a16:creationId xmlns:a16="http://schemas.microsoft.com/office/drawing/2014/main" id="{70710FEB-8AEB-4AC5-BBC2-D18A2497D9E6}"/>
+              </a:ext>
+            </a:extLst>
+          </p:cNvPr>
+          <p:cNvSpPr>
+            <a:spLocks noGrp="1"/>
+          </p:cNvSpPr>
+          <p:nvPr>
+            <p:ph idx="1"/>
+          </p:nvPr>
+        </p:nvSpPr>
+        <p:spPr/>
+        <p:txBody>
+          <a:bodyPr>
+            <a:normAutofit/>
+          </a:bodyPr>
+          <a:lstStyle/>
+          <a:p>
+            <a:pPr marL="57150" indent="0">
+              <a:buNone/>
+            </a:pPr>
+            <a:r>
+              <a:rPr lang="en-US" sz="3600" dirty="0"/>
+              <a:t>fireworks.py</a:t>
+            </a:r>
+          </a:p>
+          <a:p>
+            <a:pPr marL="57150" indent="0">
+              <a:buNone/>
+            </a:pPr>
+            <a:r>
+              <a:rPr lang="en-US" sz="3600" dirty="0">
+                <a:solidFill>
+                  <a:schemeClr val="accent1"/>
+                </a:solidFill>
+              </a:rPr>
+              <a:t>Random Expanding Balls</a:t>
+            </a:r>
+          </a:p>
+          <a:p>
+            <a:pPr>
+              <a:spcBef>
+                <a:spcPts val="600"/>
+              </a:spcBef>
+            </a:pPr>
+            <a:r>
+              <a:rPr lang="en-US" sz="3600" dirty="0">
+                <a:solidFill>
+                  <a:schemeClr val="accent1"/>
+                </a:solidFill>
+                <a:effectLst/>
+                <a:latin typeface="Calibri" panose="020F0502020204030204" pitchFamily="34" charset="0"/>
+                <a:ea typeface="Calibri" panose="020F0502020204030204" pitchFamily="34" charset="0"/>
+                <a:cs typeface="Times New Roman" panose="02020603050405020304" pitchFamily="18" charset="0"/>
+              </a:rPr>
+              <a:t>Created randomly</a:t>
+            </a:r>
+          </a:p>
+          <a:p>
+            <a:pPr>
+              <a:spcBef>
+                <a:spcPts val="0"/>
+              </a:spcBef>
+            </a:pPr>
+            <a:r>
+              <a:rPr lang="en-US" sz="3600" dirty="0">
+                <a:solidFill>
+                  <a:schemeClr val="accent1"/>
+                </a:solidFill>
+                <a:latin typeface="Calibri" panose="020F0502020204030204" pitchFamily="34" charset="0"/>
+                <a:ea typeface="Calibri" panose="020F0502020204030204" pitchFamily="34" charset="0"/>
+                <a:cs typeface="Times New Roman" panose="02020603050405020304" pitchFamily="18" charset="0"/>
+              </a:rPr>
+              <a:t>When </a:t>
+            </a:r>
+            <a:r>
+              <a:rPr lang="en-US" sz="3600" dirty="0">
+                <a:solidFill>
+                  <a:schemeClr val="accent1"/>
+                </a:solidFill>
+                <a:effectLst/>
+                <a:latin typeface="Calibri" panose="020F0502020204030204" pitchFamily="34" charset="0"/>
+                <a:ea typeface="Calibri" panose="020F0502020204030204" pitchFamily="34" charset="0"/>
+                <a:cs typeface="Times New Roman" panose="02020603050405020304" pitchFamily="18" charset="0"/>
+              </a:rPr>
+              <a:t>hitting the edge, create new</a:t>
+            </a:r>
+          </a:p>
+          <a:p>
+            <a:pPr>
+              <a:spcBef>
+                <a:spcPts val="0"/>
+              </a:spcBef>
+            </a:pPr>
+            <a:r>
+              <a:rPr lang="en-US" sz="3600" dirty="0">
+                <a:solidFill>
+                  <a:schemeClr val="accent1"/>
+                </a:solidFill>
+                <a:latin typeface="Calibri" panose="020F0502020204030204" pitchFamily="34" charset="0"/>
+                <a:ea typeface="Calibri" panose="020F0502020204030204" pitchFamily="34" charset="0"/>
+                <a:cs typeface="Times New Roman" panose="02020603050405020304" pitchFamily="18" charset="0"/>
+              </a:rPr>
+              <a:t>Looping via turtle ontimer() calls</a:t>
+            </a:r>
+            <a:endParaRPr lang="en-US" sz="3600" dirty="0">
+              <a:solidFill>
+                <a:schemeClr val="accent1"/>
+              </a:solidFill>
+              <a:effectLst/>
+              <a:latin typeface="Calibri" panose="020F0502020204030204" pitchFamily="34" charset="0"/>
+              <a:ea typeface="Calibri" panose="020F0502020204030204" pitchFamily="34" charset="0"/>
+              <a:cs typeface="Times New Roman" panose="02020603050405020304" pitchFamily="18" charset="0"/>
+            </a:endParaRPr>
+          </a:p>
+          <a:p>
+            <a:pPr lvl="1"/>
+            <a:endParaRPr lang="en-US" sz="3400" dirty="0"/>
+          </a:p>
+        </p:txBody>
+      </p:sp>
+      <p:sp>
+        <p:nvSpPr>
+          <p:cNvPr id="4" name="Date Placeholder 3">
+            <a:extLst>
+              <a:ext uri="{FF2B5EF4-FFF2-40B4-BE49-F238E27FC236}">
+                <a16:creationId xmlns:a16="http://schemas.microsoft.com/office/drawing/2014/main" id="{5FDA8CFC-99B6-4BC1-B744-86BA7FCF6EFC}"/>
+              </a:ext>
+            </a:extLst>
+          </p:cNvPr>
+          <p:cNvSpPr>
+            <a:spLocks noGrp="1"/>
+          </p:cNvSpPr>
+          <p:nvPr>
+            <p:ph type="dt" sz="half" idx="10"/>
+          </p:nvPr>
+        </p:nvSpPr>
+        <p:spPr/>
+        <p:txBody>
+          <a:bodyPr/>
+          <a:lstStyle/>
+          <a:p>
+            <a:fld id="{A7119916-CD40-456D-ABE3-55F8822671F7}" type="datetime1">
+              <a:rPr lang="en-US" smtClean="0"/>
+              <a:t>8/9/2022</a:t>
+            </a:fld>
+            <a:endParaRPr lang="en-US" dirty="0"/>
+          </a:p>
+        </p:txBody>
+      </p:sp>
+      <p:sp>
+        <p:nvSpPr>
+          <p:cNvPr id="5" name="Footer Placeholder 4">
+            <a:extLst>
+              <a:ext uri="{FF2B5EF4-FFF2-40B4-BE49-F238E27FC236}">
+                <a16:creationId xmlns:a16="http://schemas.microsoft.com/office/drawing/2014/main" id="{D516A5E1-E20A-49CB-8946-8560B81B2019}"/>
+              </a:ext>
+            </a:extLst>
+          </p:cNvPr>
+          <p:cNvSpPr>
+            <a:spLocks noGrp="1"/>
+          </p:cNvSpPr>
+          <p:nvPr>
+            <p:ph type="ftr" sz="quarter" idx="11"/>
+          </p:nvPr>
+        </p:nvSpPr>
+        <p:spPr/>
+        <p:txBody>
+          <a:bodyPr/>
+          <a:lstStyle/>
+          <a:p>
+            <a:r>
+              <a:rPr lang="en-US" dirty="0">
+                <a:hlinkClick r:id="rId2"/>
+              </a:rPr>
+              <a:t>raysmith@alum.mit.edu</a:t>
+            </a:r>
+            <a:r>
+              <a:rPr lang="en-US" dirty="0"/>
+              <a:t>	</a:t>
+            </a:r>
+            <a:r>
+              <a:rPr lang="en-US" dirty="0">
+                <a:solidFill>
+                  <a:schemeClr val="accent1"/>
+                </a:solidFill>
+              </a:rPr>
+              <a:t>Session #4   Dictionaries</a:t>
+            </a:r>
+          </a:p>
+        </p:txBody>
+      </p:sp>
+      <p:sp>
+        <p:nvSpPr>
+          <p:cNvPr id="6" name="Slide Number Placeholder 5">
+            <a:extLst>
+              <a:ext uri="{FF2B5EF4-FFF2-40B4-BE49-F238E27FC236}">
+                <a16:creationId xmlns:a16="http://schemas.microsoft.com/office/drawing/2014/main" id="{527D6DAD-9E1F-4636-8B21-D6DC1643ACA0}"/>
+              </a:ext>
+            </a:extLst>
+          </p:cNvPr>
+          <p:cNvSpPr>
+            <a:spLocks noGrp="1"/>
+          </p:cNvSpPr>
+          <p:nvPr>
+            <p:ph type="sldNum" sz="quarter" idx="12"/>
+          </p:nvPr>
+        </p:nvSpPr>
+        <p:spPr/>
+        <p:txBody>
+          <a:bodyPr/>
+          <a:lstStyle/>
+          <a:p>
+            <a:fld id="{6D22F896-40B5-4ADD-8801-0D06FADFA095}" type="slidenum">
+              <a:rPr lang="en-US" smtClean="0"/>
+              <a:t>10</a:t>
+            </a:fld>
+            <a:endParaRPr lang="en-US" dirty="0"/>
+          </a:p>
+        </p:txBody>
+      </p:sp>
+    </p:spTree>
+    <p:extLst>
+      <p:ext uri="{BB962C8B-B14F-4D97-AF65-F5344CB8AC3E}">
+        <p14:creationId xmlns:p14="http://schemas.microsoft.com/office/powerpoint/2010/main" val="3772226206"/>
+      </p:ext>
+    </p:extLst>
+  </p:cSld>
+  <p:clrMapOvr>
+    <a:masterClrMapping/>
+  </p:clrMapOvr>
+</p:sld>
+</file>
+
+<file path=ppt/slides/slide11.xml><?xml version="1.0" encoding="utf-8"?>
+<p:sld xmlns:a="http://schemas.openxmlformats.org/drawingml/2006/main" xmlns:r="http://schemas.openxmlformats.org/officeDocument/2006/relationships" xmlns:p="http://schemas.openxmlformats.org/presentationml/2006/main">
+  <p:cSld>
+    <p:spTree>
+      <p:nvGrpSpPr>
+        <p:cNvPr id="1" name=""/>
+        <p:cNvGrpSpPr/>
+        <p:nvPr/>
+      </p:nvGrpSpPr>
+      <p:grpSpPr>
+        <a:xfrm>
+          <a:off x="0" y="0"/>
+          <a:ext cx="0" cy="0"/>
+          <a:chOff x="0" y="0"/>
+          <a:chExt cx="0" cy="0"/>
+        </a:xfrm>
+      </p:grpSpPr>
+      <p:sp>
+        <p:nvSpPr>
+          <p:cNvPr id="2" name="Title 1">
+            <a:extLst>
+              <a:ext uri="{FF2B5EF4-FFF2-40B4-BE49-F238E27FC236}">
+                <a16:creationId xmlns:a16="http://schemas.microsoft.com/office/drawing/2014/main" id="{F7E90694-AA7F-451B-A875-1D23D1FDBA32}"/>
+              </a:ext>
+            </a:extLst>
+          </p:cNvPr>
+          <p:cNvSpPr>
+            <a:spLocks noGrp="1"/>
+          </p:cNvSpPr>
+          <p:nvPr>
+            <p:ph type="title"/>
+          </p:nvPr>
+        </p:nvSpPr>
+        <p:spPr>
+          <a:xfrm>
+            <a:off x="955892" y="2723015"/>
+            <a:ext cx="8596668" cy="1320800"/>
+          </a:xfrm>
+        </p:spPr>
+        <p:txBody>
+          <a:bodyPr>
+            <a:normAutofit/>
+          </a:bodyPr>
+          <a:lstStyle/>
+          <a:p>
+            <a:r>
+              <a:rPr lang="en-US" sz="6600" dirty="0"/>
+              <a:t>Question and Answer</a:t>
+            </a:r>
+          </a:p>
+        </p:txBody>
+      </p:sp>
+      <p:sp>
+        <p:nvSpPr>
+          <p:cNvPr id="4" name="Date Placeholder 3">
+            <a:extLst>
+              <a:ext uri="{FF2B5EF4-FFF2-40B4-BE49-F238E27FC236}">
+                <a16:creationId xmlns:a16="http://schemas.microsoft.com/office/drawing/2014/main" id="{B623EE2F-E3E9-437B-AFAE-1E0C5C94A5F8}"/>
+              </a:ext>
+            </a:extLst>
+          </p:cNvPr>
+          <p:cNvSpPr>
+            <a:spLocks noGrp="1"/>
+          </p:cNvSpPr>
+          <p:nvPr>
+            <p:ph type="dt" sz="half" idx="10"/>
+          </p:nvPr>
+        </p:nvSpPr>
+        <p:spPr/>
+        <p:txBody>
+          <a:bodyPr/>
+          <a:lstStyle/>
+          <a:p>
+            <a:fld id="{A7119916-CD40-456D-ABE3-55F8822671F7}" type="datetime1">
+              <a:rPr lang="en-US" smtClean="0"/>
+              <a:t>8/9/2022</a:t>
+            </a:fld>
+            <a:endParaRPr lang="en-US" dirty="0"/>
+          </a:p>
+        </p:txBody>
+      </p:sp>
+      <p:sp>
+        <p:nvSpPr>
+          <p:cNvPr id="5" name="Footer Placeholder 4">
+            <a:extLst>
+              <a:ext uri="{FF2B5EF4-FFF2-40B4-BE49-F238E27FC236}">
+                <a16:creationId xmlns:a16="http://schemas.microsoft.com/office/drawing/2014/main" id="{4E4D04EE-5AD0-4A57-A42E-AE62E411ACEA}"/>
+              </a:ext>
+            </a:extLst>
+          </p:cNvPr>
+          <p:cNvSpPr>
+            <a:spLocks noGrp="1"/>
+          </p:cNvSpPr>
+          <p:nvPr>
+            <p:ph type="ftr" sz="quarter" idx="11"/>
+          </p:nvPr>
+        </p:nvSpPr>
+        <p:spPr/>
+        <p:txBody>
+          <a:bodyPr/>
+          <a:lstStyle/>
+          <a:p>
+            <a:r>
+              <a:rPr lang="en-US" dirty="0">
+                <a:hlinkClick r:id="rId3"/>
+              </a:rPr>
+              <a:t>raysmith@alum.mit.edu</a:t>
+            </a:r>
+            <a:r>
+              <a:rPr lang="en-US" dirty="0"/>
+              <a:t>	Session #4   Dictionaries	</a:t>
+            </a:r>
+          </a:p>
+        </p:txBody>
+      </p:sp>
+      <p:sp>
+        <p:nvSpPr>
+          <p:cNvPr id="6" name="Slide Number Placeholder 5">
+            <a:extLst>
+              <a:ext uri="{FF2B5EF4-FFF2-40B4-BE49-F238E27FC236}">
+                <a16:creationId xmlns:a16="http://schemas.microsoft.com/office/drawing/2014/main" id="{9711C448-36A8-43E6-A891-6E42F22D1185}"/>
+              </a:ext>
+            </a:extLst>
+          </p:cNvPr>
+          <p:cNvSpPr>
+            <a:spLocks noGrp="1"/>
+          </p:cNvSpPr>
+          <p:nvPr>
+            <p:ph type="sldNum" sz="quarter" idx="12"/>
+          </p:nvPr>
+        </p:nvSpPr>
+        <p:spPr/>
+        <p:txBody>
+          <a:bodyPr/>
+          <a:lstStyle/>
+          <a:p>
+            <a:fld id="{6D22F896-40B5-4ADD-8801-0D06FADFA095}" type="slidenum">
+              <a:rPr lang="en-US" smtClean="0"/>
+              <a:t>11</a:t>
+            </a:fld>
+            <a:endParaRPr lang="en-US" dirty="0"/>
+          </a:p>
+        </p:txBody>
+      </p:sp>
+    </p:spTree>
+    <p:extLst>
+      <p:ext uri="{BB962C8B-B14F-4D97-AF65-F5344CB8AC3E}">
+        <p14:creationId xmlns:p14="http://schemas.microsoft.com/office/powerpoint/2010/main" val="3992011312"/>
+      </p:ext>
+    </p:extLst>
+  </p:cSld>
+  <p:clrMapOvr>
+    <a:masterClrMapping/>
+  </p:clrMapOvr>
+</p:sld>
+</file>
+
 <file path=ppt/slides/slide2.xml><?xml version="1.0" encoding="utf-8"?>
 <p:sld xmlns:a="http://schemas.openxmlformats.org/drawingml/2006/main" xmlns:r="http://schemas.openxmlformats.org/officeDocument/2006/relationships" xmlns:p="http://schemas.openxmlformats.org/presentationml/2006/main">
   <p:cSld>
@@ -8933,7 +9376,7 @@
           <a:p>
             <a:r>
               <a:rPr lang="en-US" dirty="0"/>
-              <a:t>Dictionary in use Example</a:t>
+              <a:t>Dictionary Preview Sample</a:t>
             </a:r>
           </a:p>
         </p:txBody>
@@ -8998,7 +9441,7 @@
           <a:p>
             <a:fld id="{A7119916-CD40-456D-ABE3-55F8822671F7}" type="datetime1">
               <a:rPr lang="en-US" smtClean="0"/>
-              <a:t>7/13/2022</a:t>
+              <a:t>8/9/2022</a:t>
             </a:fld>
             <a:endParaRPr lang="en-US" dirty="0"/>
           </a:p>
@@ -9297,7 +9740,7 @@
                 <a:tabLst/>
                 <a:defRPr/>
               </a:pPr>
-              <a:t>7/13/2022</a:t>
+              <a:t>8/9/2022</a:t>
             </a:fld>
             <a:endParaRPr kumimoji="0" lang="en-US" sz="900" b="0" i="0" u="none" strike="noStrike" kern="1200" cap="none" spc="0" normalizeH="0" baseline="0" noProof="0" dirty="0">
               <a:ln>
@@ -9534,6 +9977,446 @@
           <p:cNvPr id="2" name="Title 1">
             <a:extLst>
               <a:ext uri="{FF2B5EF4-FFF2-40B4-BE49-F238E27FC236}">
+                <a16:creationId xmlns:a16="http://schemas.microsoft.com/office/drawing/2014/main" id="{993601E4-B5C0-22E6-968C-7F50F86D7DA4}"/>
+              </a:ext>
+            </a:extLst>
+          </p:cNvPr>
+          <p:cNvSpPr>
+            <a:spLocks noGrp="1"/>
+          </p:cNvSpPr>
+          <p:nvPr>
+            <p:ph type="title"/>
+          </p:nvPr>
+        </p:nvSpPr>
+        <p:spPr/>
+        <p:txBody>
+          <a:bodyPr/>
+          <a:lstStyle/>
+          <a:p>
+            <a:r>
+              <a:rPr lang="en-US" dirty="0"/>
+              <a:t>					Dictionary					List</a:t>
+            </a:r>
+          </a:p>
+        </p:txBody>
+      </p:sp>
+      <p:sp>
+        <p:nvSpPr>
+          <p:cNvPr id="3" name="Content Placeholder 2">
+            <a:extLst>
+              <a:ext uri="{FF2B5EF4-FFF2-40B4-BE49-F238E27FC236}">
+                <a16:creationId xmlns:a16="http://schemas.microsoft.com/office/drawing/2014/main" id="{A705DD82-B89C-12B7-25A1-D94116FC040B}"/>
+              </a:ext>
+            </a:extLst>
+          </p:cNvPr>
+          <p:cNvSpPr>
+            <a:spLocks noGrp="1"/>
+          </p:cNvSpPr>
+          <p:nvPr>
+            <p:ph idx="1"/>
+          </p:nvPr>
+        </p:nvSpPr>
+        <p:spPr>
+          <a:xfrm>
+            <a:off x="677333" y="1447800"/>
+            <a:ext cx="10012437" cy="4593562"/>
+          </a:xfrm>
+        </p:spPr>
+        <p:txBody>
+          <a:bodyPr>
+            <a:normAutofit/>
+          </a:bodyPr>
+          <a:lstStyle/>
+          <a:p>
+            <a:pPr algn="just"/>
+            <a:r>
+              <a:rPr lang="en-US" sz="4000" dirty="0">
+                <a:solidFill>
+                  <a:schemeClr val="accent1"/>
+                </a:solidFill>
+              </a:rPr>
+              <a:t>Find:</a:t>
+            </a:r>
+            <a:r>
+              <a:rPr lang="en-US" sz="4000" dirty="0"/>
+              <a:t> 			by key					by index</a:t>
+            </a:r>
+          </a:p>
+          <a:p>
+            <a:pPr algn="just"/>
+            <a:r>
+              <a:rPr lang="en-US" sz="4000" dirty="0">
+                <a:solidFill>
+                  <a:schemeClr val="accent1"/>
+                </a:solidFill>
+              </a:rPr>
+              <a:t>Literal</a:t>
+            </a:r>
+            <a:r>
+              <a:rPr lang="en-US" sz="4000" dirty="0">
+                <a:solidFill>
+                  <a:schemeClr val="accent1"/>
+                </a:solidFill>
+                <a:latin typeface="+mj-lt"/>
+              </a:rPr>
+              <a:t>:		</a:t>
+            </a:r>
+            <a:r>
+              <a:rPr lang="en-US" sz="4000" b="1" dirty="0">
+                <a:latin typeface="+mj-lt"/>
+                <a:cs typeface="Courier New" panose="02070309020205020404" pitchFamily="49" charset="0"/>
+              </a:rPr>
+              <a:t>{</a:t>
+            </a:r>
+            <a:r>
+              <a:rPr lang="en-US" sz="4000" dirty="0">
+                <a:latin typeface="+mj-lt"/>
+                <a:cs typeface="Courier New" panose="02070309020205020404" pitchFamily="49" charset="0"/>
+              </a:rPr>
+              <a:t>key1=val1, </a:t>
+            </a:r>
+            <a:r>
+              <a:rPr lang="en-US" sz="4000" b="1" dirty="0">
+                <a:latin typeface="+mj-lt"/>
+                <a:cs typeface="Courier New" panose="02070309020205020404" pitchFamily="49" charset="0"/>
+              </a:rPr>
+              <a:t>}		[</a:t>
+            </a:r>
+            <a:r>
+              <a:rPr lang="en-US" sz="4000" dirty="0">
+                <a:latin typeface="+mj-lt"/>
+                <a:cs typeface="Courier New" panose="02070309020205020404" pitchFamily="49" charset="0"/>
+              </a:rPr>
+              <a:t>val1,val2,</a:t>
+            </a:r>
+            <a:r>
+              <a:rPr lang="en-US" sz="4000" b="1" dirty="0">
+                <a:latin typeface="+mj-lt"/>
+                <a:cs typeface="Courier New" panose="02070309020205020404" pitchFamily="49" charset="0"/>
+              </a:rPr>
+              <a:t>]</a:t>
+            </a:r>
+          </a:p>
+          <a:p>
+            <a:pPr algn="just"/>
+            <a:r>
+              <a:rPr lang="en-US" sz="4000" dirty="0">
+                <a:solidFill>
+                  <a:schemeClr val="accent1"/>
+                </a:solidFill>
+              </a:rPr>
+              <a:t>Get Elm:</a:t>
+            </a:r>
+            <a:r>
+              <a:rPr lang="en-US" sz="4000" dirty="0"/>
+              <a:t>	v = di[key]			v = li[</a:t>
+            </a:r>
+            <a:r>
+              <a:rPr lang="en-US" sz="4000" dirty="0" err="1"/>
+              <a:t>indx</a:t>
+            </a:r>
+            <a:r>
+              <a:rPr lang="en-US" sz="4000" dirty="0"/>
+              <a:t>]</a:t>
+            </a:r>
+          </a:p>
+          <a:p>
+            <a:pPr algn="just"/>
+            <a:r>
+              <a:rPr lang="en-US" sz="4000" dirty="0">
+                <a:solidFill>
+                  <a:schemeClr val="accent1"/>
+                </a:solidFill>
+              </a:rPr>
+              <a:t>Set Elm:</a:t>
+            </a:r>
+            <a:r>
+              <a:rPr lang="en-US" sz="4000" dirty="0"/>
+              <a:t>		di[key]=</a:t>
+            </a:r>
+            <a:r>
+              <a:rPr lang="en-US" sz="4000" dirty="0" err="1"/>
+              <a:t>val</a:t>
+            </a:r>
+            <a:r>
+              <a:rPr lang="en-US" sz="4000" dirty="0"/>
+              <a:t>			li[</a:t>
+            </a:r>
+            <a:r>
+              <a:rPr lang="en-US" sz="4000" dirty="0" err="1"/>
+              <a:t>indx</a:t>
+            </a:r>
+            <a:r>
+              <a:rPr lang="en-US" sz="4000" dirty="0"/>
+              <a:t>] = </a:t>
+            </a:r>
+            <a:r>
+              <a:rPr lang="en-US" sz="4000" dirty="0" err="1"/>
+              <a:t>val</a:t>
+            </a:r>
+            <a:endParaRPr lang="en-US" sz="4000" dirty="0"/>
+          </a:p>
+          <a:p>
+            <a:pPr algn="just"/>
+            <a:r>
+              <a:rPr lang="en-US" sz="4000" dirty="0">
+                <a:solidFill>
+                  <a:schemeClr val="accent1"/>
+                </a:solidFill>
+              </a:rPr>
+              <a:t>Add to end:</a:t>
+            </a:r>
+            <a:r>
+              <a:rPr lang="en-US" sz="4000" dirty="0"/>
+              <a:t>	</a:t>
+            </a:r>
+            <a:r>
+              <a:rPr lang="en-US" sz="4000" dirty="0">
+                <a:solidFill>
+                  <a:schemeClr val="bg1">
+                    <a:lumMod val="65000"/>
+                  </a:schemeClr>
+                </a:solidFill>
+              </a:rPr>
+              <a:t>NA	</a:t>
+            </a:r>
+            <a:r>
+              <a:rPr lang="en-US" sz="4000" dirty="0"/>
+              <a:t>				</a:t>
+            </a:r>
+            <a:r>
+              <a:rPr lang="en-US" sz="4000" dirty="0" err="1"/>
+              <a:t>li.append</a:t>
+            </a:r>
+            <a:r>
+              <a:rPr lang="en-US" sz="4000" dirty="0"/>
+              <a:t>(</a:t>
+            </a:r>
+            <a:r>
+              <a:rPr lang="en-US" sz="4000" dirty="0" err="1"/>
+              <a:t>val</a:t>
+            </a:r>
+            <a:r>
+              <a:rPr lang="en-US" sz="4000" dirty="0"/>
+              <a:t>)</a:t>
+            </a:r>
+          </a:p>
+          <a:p>
+            <a:pPr algn="just"/>
+            <a:r>
+              <a:rPr lang="en-US" sz="4000" dirty="0">
+                <a:solidFill>
+                  <a:schemeClr val="accent1"/>
+                </a:solidFill>
+              </a:rPr>
+              <a:t>Traverse:</a:t>
+            </a:r>
+            <a:r>
+              <a:rPr lang="en-US" sz="4000" dirty="0"/>
+              <a:t> 	</a:t>
+            </a:r>
+            <a:r>
+              <a:rPr lang="en-US" sz="4000" b="1" dirty="0">
+                <a:latin typeface="+mj-lt"/>
+                <a:cs typeface="Courier New" panose="02070309020205020404" pitchFamily="49" charset="0"/>
+              </a:rPr>
+              <a:t>for</a:t>
+            </a:r>
+            <a:r>
+              <a:rPr lang="en-US" sz="4000" dirty="0">
+                <a:latin typeface="+mj-lt"/>
+                <a:cs typeface="Courier New" panose="02070309020205020404" pitchFamily="49" charset="0"/>
+              </a:rPr>
+              <a:t> key </a:t>
+            </a:r>
+            <a:r>
+              <a:rPr lang="en-US" sz="4000" b="1" dirty="0">
+                <a:latin typeface="+mj-lt"/>
+                <a:cs typeface="Courier New" panose="02070309020205020404" pitchFamily="49" charset="0"/>
+              </a:rPr>
+              <a:t>in</a:t>
+            </a:r>
+            <a:r>
+              <a:rPr lang="en-US" sz="4000" dirty="0">
+                <a:latin typeface="+mj-lt"/>
+                <a:cs typeface="Courier New" panose="02070309020205020404" pitchFamily="49" charset="0"/>
+              </a:rPr>
+              <a:t> di:</a:t>
+            </a:r>
+            <a:r>
+              <a:rPr lang="en-US" sz="4000" dirty="0">
+                <a:latin typeface="+mj-lt"/>
+              </a:rPr>
+              <a:t>	</a:t>
+            </a:r>
+            <a:r>
+              <a:rPr lang="en-US" sz="4000" b="1" dirty="0">
+                <a:latin typeface="+mj-lt"/>
+              </a:rPr>
+              <a:t>for</a:t>
+            </a:r>
+            <a:r>
+              <a:rPr lang="en-US" sz="4000" dirty="0">
+                <a:latin typeface="+mj-lt"/>
+              </a:rPr>
+              <a:t> </a:t>
+            </a:r>
+            <a:r>
+              <a:rPr lang="en-US" sz="4000" dirty="0" err="1">
+                <a:latin typeface="+mj-lt"/>
+                <a:cs typeface="Courier New" panose="02070309020205020404" pitchFamily="49" charset="0"/>
+              </a:rPr>
+              <a:t>val</a:t>
+            </a:r>
+            <a:r>
+              <a:rPr lang="en-US" sz="4000" dirty="0">
+                <a:latin typeface="+mj-lt"/>
+                <a:cs typeface="Courier New" panose="02070309020205020404" pitchFamily="49" charset="0"/>
+              </a:rPr>
+              <a:t> </a:t>
+            </a:r>
+            <a:r>
+              <a:rPr lang="en-US" sz="4000" b="1" dirty="0">
+                <a:latin typeface="+mj-lt"/>
+                <a:cs typeface="Courier New" panose="02070309020205020404" pitchFamily="49" charset="0"/>
+              </a:rPr>
+              <a:t>in</a:t>
+            </a:r>
+            <a:r>
+              <a:rPr lang="en-US" sz="4000" dirty="0">
+                <a:latin typeface="+mj-lt"/>
+                <a:cs typeface="Courier New" panose="02070309020205020404" pitchFamily="49" charset="0"/>
+              </a:rPr>
+              <a:t> li:</a:t>
+            </a:r>
+          </a:p>
+          <a:p>
+            <a:pPr algn="just"/>
+            <a:endParaRPr lang="en-US" sz="3200" dirty="0"/>
+          </a:p>
+        </p:txBody>
+      </p:sp>
+      <p:sp>
+        <p:nvSpPr>
+          <p:cNvPr id="4" name="Date Placeholder 3">
+            <a:extLst>
+              <a:ext uri="{FF2B5EF4-FFF2-40B4-BE49-F238E27FC236}">
+                <a16:creationId xmlns:a16="http://schemas.microsoft.com/office/drawing/2014/main" id="{C32D205D-5C0C-623E-C32A-11302A36236E}"/>
+              </a:ext>
+            </a:extLst>
+          </p:cNvPr>
+          <p:cNvSpPr>
+            <a:spLocks noGrp="1"/>
+          </p:cNvSpPr>
+          <p:nvPr>
+            <p:ph type="dt" sz="half" idx="10"/>
+          </p:nvPr>
+        </p:nvSpPr>
+        <p:spPr/>
+        <p:txBody>
+          <a:bodyPr/>
+          <a:lstStyle/>
+          <a:p>
+            <a:fld id="{A7119916-CD40-456D-ABE3-55F8822671F7}" type="datetime1">
+              <a:rPr lang="en-US" smtClean="0"/>
+              <a:t>8/9/2022</a:t>
+            </a:fld>
+            <a:endParaRPr lang="en-US" dirty="0"/>
+          </a:p>
+        </p:txBody>
+      </p:sp>
+      <p:sp>
+        <p:nvSpPr>
+          <p:cNvPr id="5" name="Footer Placeholder 4">
+            <a:extLst>
+              <a:ext uri="{FF2B5EF4-FFF2-40B4-BE49-F238E27FC236}">
+                <a16:creationId xmlns:a16="http://schemas.microsoft.com/office/drawing/2014/main" id="{16FF08CC-BC55-6456-862C-81578EC93398}"/>
+              </a:ext>
+            </a:extLst>
+          </p:cNvPr>
+          <p:cNvSpPr>
+            <a:spLocks noGrp="1"/>
+          </p:cNvSpPr>
+          <p:nvPr>
+            <p:ph type="ftr" sz="quarter" idx="11"/>
+          </p:nvPr>
+        </p:nvSpPr>
+        <p:spPr/>
+        <p:txBody>
+          <a:bodyPr/>
+          <a:lstStyle/>
+          <a:p>
+            <a:r>
+              <a:rPr lang="en-US" dirty="0"/>
+              <a:t>raysmith@alum.mit.edu</a:t>
+            </a:r>
+          </a:p>
+        </p:txBody>
+      </p:sp>
+      <p:sp>
+        <p:nvSpPr>
+          <p:cNvPr id="6" name="Slide Number Placeholder 5">
+            <a:extLst>
+              <a:ext uri="{FF2B5EF4-FFF2-40B4-BE49-F238E27FC236}">
+                <a16:creationId xmlns:a16="http://schemas.microsoft.com/office/drawing/2014/main" id="{BD93333E-A416-96A2-C96E-E86934382296}"/>
+              </a:ext>
+            </a:extLst>
+          </p:cNvPr>
+          <p:cNvSpPr>
+            <a:spLocks noGrp="1"/>
+          </p:cNvSpPr>
+          <p:nvPr>
+            <p:ph type="sldNum" sz="quarter" idx="12"/>
+          </p:nvPr>
+        </p:nvSpPr>
+        <p:spPr/>
+        <p:txBody>
+          <a:bodyPr/>
+          <a:lstStyle/>
+          <a:p>
+            <a:fld id="{6D22F896-40B5-4ADD-8801-0D06FADFA095}" type="slidenum">
+              <a:rPr lang="en-US" smtClean="0"/>
+              <a:t>4</a:t>
+            </a:fld>
+            <a:endParaRPr lang="en-US" dirty="0"/>
+          </a:p>
+        </p:txBody>
+      </p:sp>
+    </p:spTree>
+    <p:extLst>
+      <p:ext uri="{BB962C8B-B14F-4D97-AF65-F5344CB8AC3E}">
+        <p14:creationId xmlns:p14="http://schemas.microsoft.com/office/powerpoint/2010/main" val="1625226408"/>
+      </p:ext>
+    </p:extLst>
+  </p:cSld>
+  <p:clrMapOvr>
+    <a:masterClrMapping/>
+  </p:clrMapOvr>
+</p:sld>
+</file>
+
+<file path=ppt/slides/slide5.xml><?xml version="1.0" encoding="utf-8"?>
+<p:sld xmlns:a="http://schemas.openxmlformats.org/drawingml/2006/main" xmlns:r="http://schemas.openxmlformats.org/officeDocument/2006/relationships" xmlns:p="http://schemas.openxmlformats.org/presentationml/2006/main">
+  <p:cSld>
+    <p:spTree>
+      <p:nvGrpSpPr>
+        <p:cNvPr id="1" name=""/>
+        <p:cNvGrpSpPr/>
+        <p:nvPr/>
+      </p:nvGrpSpPr>
+      <p:grpSpPr>
+        <a:xfrm>
+          <a:off x="0" y="0"/>
+          <a:ext cx="0" cy="0"/>
+          <a:chOff x="0" y="0"/>
+          <a:chExt cx="0" cy="0"/>
+        </a:xfrm>
+      </p:grpSpPr>
+      <p:sp>
+        <p:nvSpPr>
+          <p:cNvPr id="2" name="Title 1">
+            <a:extLst>
+              <a:ext uri="{FF2B5EF4-FFF2-40B4-BE49-F238E27FC236}">
                 <a16:creationId xmlns:a16="http://schemas.microsoft.com/office/drawing/2014/main" id="{9E6A877F-A718-47D6-828D-F14357B0EE64}"/>
               </a:ext>
             </a:extLst>
@@ -9742,506 +10625,7 @@
                 <a:tabLst/>
                 <a:defRPr/>
               </a:pPr>
-              <a:t>7/13/2022</a:t>
-            </a:fld>
-            <a:endParaRPr kumimoji="0" lang="en-US" sz="900" b="0" i="0" u="none" strike="noStrike" kern="1200" cap="none" spc="0" normalizeH="0" baseline="0" noProof="0" dirty="0">
-              <a:ln>
-                <a:noFill/>
-              </a:ln>
-              <a:solidFill>
-                <a:prstClr val="black">
-                  <a:tint val="75000"/>
-                </a:prstClr>
-              </a:solidFill>
-              <a:effectLst/>
-              <a:uLnTx/>
-              <a:uFillTx/>
-              <a:latin typeface="Trebuchet MS" panose="020B0603020202020204"/>
-              <a:ea typeface="+mn-ea"/>
-              <a:cs typeface="+mn-cs"/>
-            </a:endParaRPr>
-          </a:p>
-        </p:txBody>
-      </p:sp>
-      <p:sp>
-        <p:nvSpPr>
-          <p:cNvPr id="5" name="Footer Placeholder 4">
-            <a:extLst>
-              <a:ext uri="{FF2B5EF4-FFF2-40B4-BE49-F238E27FC236}">
-                <a16:creationId xmlns:a16="http://schemas.microsoft.com/office/drawing/2014/main" id="{4351A704-7B25-4E2E-AEDE-6CB83EBFD759}"/>
-              </a:ext>
-            </a:extLst>
-          </p:cNvPr>
-          <p:cNvSpPr>
-            <a:spLocks noGrp="1"/>
-          </p:cNvSpPr>
-          <p:nvPr>
-            <p:ph type="ftr" sz="quarter" idx="11"/>
-          </p:nvPr>
-        </p:nvSpPr>
-        <p:spPr/>
-        <p:txBody>
-          <a:bodyPr/>
-          <a:lstStyle/>
-          <a:p>
-            <a:pPr marL="0" marR="0" lvl="0" indent="0" algn="l" defTabSz="457200" rtl="0" eaLnBrk="1" fontAlgn="auto" latinLnBrk="0" hangingPunct="1">
-              <a:lnSpc>
-                <a:spcPct val="100000"/>
-              </a:lnSpc>
-              <a:spcBef>
-                <a:spcPts val="0"/>
-              </a:spcBef>
-              <a:spcAft>
-                <a:spcPts val="0"/>
-              </a:spcAft>
-              <a:buClrTx/>
-              <a:buSzTx/>
-              <a:buFontTx/>
-              <a:buNone/>
-              <a:tabLst/>
-              <a:defRPr/>
-            </a:pPr>
-            <a:r>
-              <a:rPr kumimoji="0" lang="en-US" sz="900" b="0" i="0" u="none" strike="noStrike" kern="1200" cap="none" spc="0" normalizeH="0" baseline="0" noProof="0" dirty="0">
-                <a:ln>
-                  <a:noFill/>
-                </a:ln>
-                <a:solidFill>
-                  <a:prstClr val="black">
-                    <a:tint val="75000"/>
-                  </a:prstClr>
-                </a:solidFill>
-                <a:effectLst/>
-                <a:uLnTx/>
-                <a:uFillTx/>
-                <a:latin typeface="Trebuchet MS" panose="020B0603020202020204"/>
-                <a:ea typeface="+mn-ea"/>
-                <a:cs typeface="+mn-cs"/>
-                <a:hlinkClick r:id="rId3"/>
-              </a:rPr>
-              <a:t>raysmith@alum.mit.edu</a:t>
-            </a:r>
-            <a:r>
-              <a:rPr kumimoji="0" lang="en-US" sz="900" b="0" i="0" u="none" strike="noStrike" kern="1200" cap="none" spc="0" normalizeH="0" baseline="0" noProof="0" dirty="0">
-                <a:ln>
-                  <a:noFill/>
-                </a:ln>
-                <a:solidFill>
-                  <a:prstClr val="black">
-                    <a:tint val="75000"/>
-                  </a:prstClr>
-                </a:solidFill>
-                <a:effectLst/>
-                <a:uLnTx/>
-                <a:uFillTx/>
-                <a:latin typeface="Trebuchet MS" panose="020B0603020202020204"/>
-                <a:ea typeface="+mn-ea"/>
-                <a:cs typeface="+mn-cs"/>
-              </a:rPr>
-              <a:t>	Session #4   Dictionaries</a:t>
-            </a:r>
-          </a:p>
-        </p:txBody>
-      </p:sp>
-      <p:sp>
-        <p:nvSpPr>
-          <p:cNvPr id="6" name="Slide Number Placeholder 5">
-            <a:extLst>
-              <a:ext uri="{FF2B5EF4-FFF2-40B4-BE49-F238E27FC236}">
-                <a16:creationId xmlns:a16="http://schemas.microsoft.com/office/drawing/2014/main" id="{56C88A13-9CB2-48B8-A37E-911D446CDA3D}"/>
-              </a:ext>
-            </a:extLst>
-          </p:cNvPr>
-          <p:cNvSpPr>
-            <a:spLocks noGrp="1"/>
-          </p:cNvSpPr>
-          <p:nvPr>
-            <p:ph type="sldNum" sz="quarter" idx="12"/>
-          </p:nvPr>
-        </p:nvSpPr>
-        <p:spPr/>
-        <p:txBody>
-          <a:bodyPr/>
-          <a:lstStyle/>
-          <a:p>
-            <a:pPr marL="0" marR="0" lvl="0" indent="0" algn="r" defTabSz="457200" rtl="0" eaLnBrk="1" fontAlgn="auto" latinLnBrk="0" hangingPunct="1">
-              <a:lnSpc>
-                <a:spcPct val="100000"/>
-              </a:lnSpc>
-              <a:spcBef>
-                <a:spcPts val="0"/>
-              </a:spcBef>
-              <a:spcAft>
-                <a:spcPts val="0"/>
-              </a:spcAft>
-              <a:buClrTx/>
-              <a:buSzTx/>
-              <a:buFontTx/>
-              <a:buNone/>
-              <a:tabLst/>
-              <a:defRPr/>
-            </a:pPr>
-            <a:fld id="{6D22F896-40B5-4ADD-8801-0D06FADFA095}" type="slidenum">
-              <a:rPr kumimoji="0" lang="en-US" sz="900" b="0" i="0" u="none" strike="noStrike" kern="1200" cap="none" spc="0" normalizeH="0" baseline="0" noProof="0" smtClean="0">
-                <a:ln>
-                  <a:noFill/>
-                </a:ln>
-                <a:solidFill>
-                  <a:srgbClr val="90C226"/>
-                </a:solidFill>
-                <a:effectLst/>
-                <a:uLnTx/>
-                <a:uFillTx/>
-                <a:latin typeface="Trebuchet MS" panose="020B0603020202020204"/>
-                <a:ea typeface="+mn-ea"/>
-                <a:cs typeface="+mn-cs"/>
-              </a:rPr>
-              <a:pPr marL="0" marR="0" lvl="0" indent="0" algn="r" defTabSz="457200" rtl="0" eaLnBrk="1" fontAlgn="auto" latinLnBrk="0" hangingPunct="1">
-                <a:lnSpc>
-                  <a:spcPct val="100000"/>
-                </a:lnSpc>
-                <a:spcBef>
-                  <a:spcPts val="0"/>
-                </a:spcBef>
-                <a:spcAft>
-                  <a:spcPts val="0"/>
-                </a:spcAft>
-                <a:buClrTx/>
-                <a:buSzTx/>
-                <a:buFontTx/>
-                <a:buNone/>
-                <a:tabLst/>
-                <a:defRPr/>
-              </a:pPr>
-              <a:t>4</a:t>
-            </a:fld>
-            <a:endParaRPr kumimoji="0" lang="en-US" sz="900" b="0" i="0" u="none" strike="noStrike" kern="1200" cap="none" spc="0" normalizeH="0" baseline="0" noProof="0" dirty="0">
-              <a:ln>
-                <a:noFill/>
-              </a:ln>
-              <a:solidFill>
-                <a:srgbClr val="90C226"/>
-              </a:solidFill>
-              <a:effectLst/>
-              <a:uLnTx/>
-              <a:uFillTx/>
-              <a:latin typeface="Trebuchet MS" panose="020B0603020202020204"/>
-              <a:ea typeface="+mn-ea"/>
-              <a:cs typeface="+mn-cs"/>
-            </a:endParaRPr>
-          </a:p>
-        </p:txBody>
-      </p:sp>
-    </p:spTree>
-    <p:extLst>
-      <p:ext uri="{BB962C8B-B14F-4D97-AF65-F5344CB8AC3E}">
-        <p14:creationId xmlns:p14="http://schemas.microsoft.com/office/powerpoint/2010/main" val="1664134952"/>
-      </p:ext>
-    </p:extLst>
-  </p:cSld>
-  <p:clrMapOvr>
-    <a:masterClrMapping/>
-  </p:clrMapOvr>
-  <mc:AlternateContent xmlns:mc="http://schemas.openxmlformats.org/markup-compatibility/2006" xmlns:p14="http://schemas.microsoft.com/office/powerpoint/2010/main">
-    <mc:Choice Requires="p14">
-      <p:transition spd="med" p14:dur="700">
-        <p:fade/>
-      </p:transition>
-    </mc:Choice>
-    <mc:Fallback xmlns="">
-      <p:transition spd="med">
-        <p:fade/>
-      </p:transition>
-    </mc:Fallback>
-  </mc:AlternateContent>
-</p:sld>
-</file>
-
-<file path=ppt/slides/slide5.xml><?xml version="1.0" encoding="utf-8"?>
-<p:sld xmlns:a="http://schemas.openxmlformats.org/drawingml/2006/main" xmlns:r="http://schemas.openxmlformats.org/officeDocument/2006/relationships" xmlns:p="http://schemas.openxmlformats.org/presentationml/2006/main">
-  <p:cSld>
-    <p:spTree>
-      <p:nvGrpSpPr>
-        <p:cNvPr id="1" name=""/>
-        <p:cNvGrpSpPr/>
-        <p:nvPr/>
-      </p:nvGrpSpPr>
-      <p:grpSpPr>
-        <a:xfrm>
-          <a:off x="0" y="0"/>
-          <a:ext cx="0" cy="0"/>
-          <a:chOff x="0" y="0"/>
-          <a:chExt cx="0" cy="0"/>
-        </a:xfrm>
-      </p:grpSpPr>
-      <p:sp>
-        <p:nvSpPr>
-          <p:cNvPr id="2" name="Title 1">
-            <a:extLst>
-              <a:ext uri="{FF2B5EF4-FFF2-40B4-BE49-F238E27FC236}">
-                <a16:creationId xmlns:a16="http://schemas.microsoft.com/office/drawing/2014/main" id="{9E6A877F-A718-47D6-828D-F14357B0EE64}"/>
-              </a:ext>
-            </a:extLst>
-          </p:cNvPr>
-          <p:cNvSpPr>
-            <a:spLocks noGrp="1"/>
-          </p:cNvSpPr>
-          <p:nvPr>
-            <p:ph type="title"/>
-          </p:nvPr>
-        </p:nvSpPr>
-        <p:spPr>
-          <a:xfrm>
-            <a:off x="677334" y="609600"/>
-            <a:ext cx="8596668" cy="906966"/>
-          </a:xfrm>
-        </p:spPr>
-        <p:txBody>
-          <a:bodyPr/>
-          <a:lstStyle/>
-          <a:p>
-            <a:r>
-              <a:rPr lang="en-US" dirty="0"/>
-              <a:t>Using Dictionary as command list</a:t>
-            </a:r>
-          </a:p>
-        </p:txBody>
-      </p:sp>
-      <p:sp>
-        <p:nvSpPr>
-          <p:cNvPr id="3" name="Content Placeholder 2">
-            <a:extLst>
-              <a:ext uri="{FF2B5EF4-FFF2-40B4-BE49-F238E27FC236}">
-                <a16:creationId xmlns:a16="http://schemas.microsoft.com/office/drawing/2014/main" id="{64372DD4-6DBF-43CC-8728-9C2DC16B0267}"/>
-              </a:ext>
-            </a:extLst>
-          </p:cNvPr>
-          <p:cNvSpPr>
-            <a:spLocks noGrp="1"/>
-          </p:cNvSpPr>
-          <p:nvPr>
-            <p:ph idx="1"/>
-          </p:nvPr>
-        </p:nvSpPr>
-        <p:spPr>
-          <a:xfrm>
-            <a:off x="-423745" y="1516567"/>
-            <a:ext cx="10682867" cy="4524796"/>
-          </a:xfrm>
-        </p:spPr>
-        <p:txBody>
-          <a:bodyPr>
-            <a:normAutofit lnSpcReduction="10000"/>
-          </a:bodyPr>
-          <a:lstStyle/>
-          <a:p>
-            <a:pPr marL="400050" lvl="1" indent="0">
-              <a:buNone/>
-            </a:pPr>
-            <a:r>
-              <a:rPr lang="en-US" sz="3200" dirty="0">
-                <a:latin typeface="Courier New" panose="02070309020205020404" pitchFamily="49" charset="0"/>
-                <a:cs typeface="Courier New" panose="02070309020205020404" pitchFamily="49" charset="0"/>
-              </a:rPr>
-              <a:t>commands = </a:t>
-            </a:r>
-            <a:r>
-              <a:rPr lang="en-US" sz="3200" b="1" dirty="0">
-                <a:solidFill>
-                  <a:srgbClr val="0070C0"/>
-                </a:solidFill>
-                <a:latin typeface="Courier New" panose="02070309020205020404" pitchFamily="49" charset="0"/>
-                <a:cs typeface="Courier New" panose="02070309020205020404" pitchFamily="49" charset="0"/>
-              </a:rPr>
-              <a:t>{</a:t>
-            </a:r>
-            <a:r>
-              <a:rPr lang="en-US" sz="3200" dirty="0">
-                <a:latin typeface="Courier New" panose="02070309020205020404" pitchFamily="49" charset="0"/>
-                <a:cs typeface="Courier New" panose="02070309020205020404" pitchFamily="49" charset="0"/>
-              </a:rPr>
-              <a:t>"up":1, "down":1, "left":1, "right":1</a:t>
-            </a:r>
-            <a:r>
-              <a:rPr lang="en-US" sz="3200" b="1" dirty="0">
-                <a:solidFill>
-                  <a:srgbClr val="0070C0"/>
-                </a:solidFill>
-                <a:latin typeface="Courier New" panose="02070309020205020404" pitchFamily="49" charset="0"/>
-                <a:cs typeface="Courier New" panose="02070309020205020404" pitchFamily="49" charset="0"/>
-              </a:rPr>
-              <a:t>}</a:t>
-            </a:r>
-          </a:p>
-          <a:p>
-            <a:pPr marL="400050" lvl="1" indent="0">
-              <a:buNone/>
-            </a:pPr>
-            <a:r>
-              <a:rPr lang="en-US" sz="3200" dirty="0">
-                <a:latin typeface="Courier New" panose="02070309020205020404" pitchFamily="49" charset="0"/>
-                <a:cs typeface="Courier New" panose="02070309020205020404" pitchFamily="49" charset="0"/>
-              </a:rPr>
-              <a:t>for inp in </a:t>
-            </a:r>
-            <a:r>
-              <a:rPr lang="en-US" sz="3200" b="1" dirty="0">
-                <a:solidFill>
-                  <a:srgbClr val="0070C0"/>
-                </a:solidFill>
-                <a:latin typeface="Courier New" panose="02070309020205020404" pitchFamily="49" charset="0"/>
-                <a:cs typeface="Courier New" panose="02070309020205020404" pitchFamily="49" charset="0"/>
-              </a:rPr>
-              <a:t>[</a:t>
-            </a:r>
-            <a:r>
-              <a:rPr lang="en-US" sz="3200" dirty="0">
-                <a:latin typeface="Courier New" panose="02070309020205020404" pitchFamily="49" charset="0"/>
-                <a:cs typeface="Courier New" panose="02070309020205020404" pitchFamily="49" charset="0"/>
-              </a:rPr>
-              <a:t>"up", "down", "in", "out"</a:t>
-            </a:r>
-            <a:r>
-              <a:rPr lang="en-US" sz="3200" b="1" dirty="0">
-                <a:solidFill>
-                  <a:srgbClr val="0070C0"/>
-                </a:solidFill>
-                <a:latin typeface="Courier New" panose="02070309020205020404" pitchFamily="49" charset="0"/>
-                <a:cs typeface="Courier New" panose="02070309020205020404" pitchFamily="49" charset="0"/>
-              </a:rPr>
-              <a:t>]</a:t>
-            </a:r>
-            <a:r>
-              <a:rPr lang="en-US" sz="3200" dirty="0">
-                <a:latin typeface="Courier New" panose="02070309020205020404" pitchFamily="49" charset="0"/>
-                <a:cs typeface="Courier New" panose="02070309020205020404" pitchFamily="49" charset="0"/>
-              </a:rPr>
-              <a:t>:</a:t>
-            </a:r>
-          </a:p>
-          <a:p>
-            <a:pPr marL="400050" lvl="1" indent="0">
-              <a:buNone/>
-            </a:pPr>
-            <a:r>
-              <a:rPr lang="en-US" sz="3200" dirty="0">
-                <a:latin typeface="Courier New" panose="02070309020205020404" pitchFamily="49" charset="0"/>
-                <a:cs typeface="Courier New" panose="02070309020205020404" pitchFamily="49" charset="0"/>
-              </a:rPr>
-              <a:t>    if inp in commands:</a:t>
-            </a:r>
-          </a:p>
-          <a:p>
-            <a:pPr marL="400050" lvl="1" indent="0">
-              <a:buNone/>
-            </a:pPr>
-            <a:r>
-              <a:rPr lang="en-US" sz="3200" dirty="0">
-                <a:latin typeface="Courier New" panose="02070309020205020404" pitchFamily="49" charset="0"/>
-                <a:cs typeface="Courier New" panose="02070309020205020404" pitchFamily="49" charset="0"/>
-              </a:rPr>
-              <a:t>        print("Do cmd:", inp)</a:t>
-            </a:r>
-          </a:p>
-          <a:p>
-            <a:pPr marL="400050" lvl="1" indent="0">
-              <a:buNone/>
-            </a:pPr>
-            <a:r>
-              <a:rPr lang="en-US" sz="3200" dirty="0">
-                <a:latin typeface="Courier New" panose="02070309020205020404" pitchFamily="49" charset="0"/>
-                <a:cs typeface="Courier New" panose="02070309020205020404" pitchFamily="49" charset="0"/>
-              </a:rPr>
-              <a:t>    else:</a:t>
-            </a:r>
-          </a:p>
-          <a:p>
-            <a:pPr marL="400050" lvl="1" indent="0">
-              <a:buNone/>
-            </a:pPr>
-            <a:r>
-              <a:rPr lang="en-US" sz="3200" dirty="0">
-                <a:latin typeface="Courier New" panose="02070309020205020404" pitchFamily="49" charset="0"/>
-                <a:cs typeface="Courier New" panose="02070309020205020404" pitchFamily="49" charset="0"/>
-              </a:rPr>
-              <a:t>        print("input:", inp, "not in:", commands)</a:t>
-            </a:r>
-          </a:p>
-        </p:txBody>
-      </p:sp>
-      <p:sp>
-        <p:nvSpPr>
-          <p:cNvPr id="4" name="Date Placeholder 3">
-            <a:extLst>
-              <a:ext uri="{FF2B5EF4-FFF2-40B4-BE49-F238E27FC236}">
-                <a16:creationId xmlns:a16="http://schemas.microsoft.com/office/drawing/2014/main" id="{7DBC778F-46A9-469B-AFCA-A7F523273D3A}"/>
-              </a:ext>
-            </a:extLst>
-          </p:cNvPr>
-          <p:cNvSpPr>
-            <a:spLocks noGrp="1"/>
-          </p:cNvSpPr>
-          <p:nvPr>
-            <p:ph type="dt" sz="half" idx="10"/>
-          </p:nvPr>
-        </p:nvSpPr>
-        <p:spPr/>
-        <p:txBody>
-          <a:bodyPr/>
-          <a:lstStyle/>
-          <a:p>
-            <a:pPr marL="0" marR="0" lvl="0" indent="0" algn="r" defTabSz="457200" rtl="0" eaLnBrk="1" fontAlgn="auto" latinLnBrk="0" hangingPunct="1">
-              <a:lnSpc>
-                <a:spcPct val="100000"/>
-              </a:lnSpc>
-              <a:spcBef>
-                <a:spcPts val="0"/>
-              </a:spcBef>
-              <a:spcAft>
-                <a:spcPts val="0"/>
-              </a:spcAft>
-              <a:buClrTx/>
-              <a:buSzTx/>
-              <a:buFontTx/>
-              <a:buNone/>
-              <a:tabLst/>
-              <a:defRPr/>
-            </a:pPr>
-            <a:fld id="{A7119916-CD40-456D-ABE3-55F8822671F7}" type="datetime1">
-              <a:rPr kumimoji="0" lang="en-US" sz="900" b="0" i="0" u="none" strike="noStrike" kern="1200" cap="none" spc="0" normalizeH="0" baseline="0" noProof="0" smtClean="0">
-                <a:ln>
-                  <a:noFill/>
-                </a:ln>
-                <a:solidFill>
-                  <a:prstClr val="black">
-                    <a:tint val="75000"/>
-                  </a:prstClr>
-                </a:solidFill>
-                <a:effectLst/>
-                <a:uLnTx/>
-                <a:uFillTx/>
-                <a:latin typeface="Trebuchet MS" panose="020B0603020202020204"/>
-                <a:ea typeface="+mn-ea"/>
-                <a:cs typeface="+mn-cs"/>
-              </a:rPr>
-              <a:pPr marL="0" marR="0" lvl="0" indent="0" algn="r" defTabSz="457200" rtl="0" eaLnBrk="1" fontAlgn="auto" latinLnBrk="0" hangingPunct="1">
-                <a:lnSpc>
-                  <a:spcPct val="100000"/>
-                </a:lnSpc>
-                <a:spcBef>
-                  <a:spcPts val="0"/>
-                </a:spcBef>
-                <a:spcAft>
-                  <a:spcPts val="0"/>
-                </a:spcAft>
-                <a:buClrTx/>
-                <a:buSzTx/>
-                <a:buFontTx/>
-                <a:buNone/>
-                <a:tabLst/>
-                <a:defRPr/>
-              </a:pPr>
-              <a:t>7/13/2022</a:t>
+              <a:t>8/9/2022</a:t>
             </a:fld>
             <a:endParaRPr kumimoji="0" lang="en-US" sz="900" b="0" i="0" u="none" strike="noStrike" kern="1200" cap="none" spc="0" normalizeH="0" baseline="0" noProof="0" dirty="0">
               <a:ln>
@@ -10434,7 +10818,7 @@
     </p:spTree>
     <p:extLst>
       <p:ext uri="{BB962C8B-B14F-4D97-AF65-F5344CB8AC3E}">
-        <p14:creationId xmlns:p14="http://schemas.microsoft.com/office/powerpoint/2010/main" val="3493103076"/>
+        <p14:creationId xmlns:p14="http://schemas.microsoft.com/office/powerpoint/2010/main" val="1664134952"/>
       </p:ext>
     </p:extLst>
   </p:cSld>
@@ -10457,21 +10841,8 @@
 </file>
 
 <file path=ppt/slides/slide6.xml><?xml version="1.0" encoding="utf-8"?>
-<p:sld xmlns:a="http://schemas.openxmlformats.org/drawingml/2006/main" xmlns:r="http://schemas.openxmlformats.org/officeDocument/2006/relationships" xmlns:p="http://schemas.openxmlformats.org/presentationml/2006/main" showMasterSp="0">
+<p:sld xmlns:a="http://schemas.openxmlformats.org/drawingml/2006/main" xmlns:r="http://schemas.openxmlformats.org/officeDocument/2006/relationships" xmlns:p="http://schemas.openxmlformats.org/presentationml/2006/main">
   <p:cSld>
-    <p:bg>
-      <p:bgPr>
-        <a:pattFill prst="smConfetti">
-          <a:fgClr>
-            <a:schemeClr val="accent1"/>
-          </a:fgClr>
-          <a:bgClr>
-            <a:schemeClr val="bg1"/>
-          </a:bgClr>
-        </a:pattFill>
-        <a:effectLst/>
-      </p:bgPr>
-    </p:bg>
     <p:spTree>
       <p:nvGrpSpPr>
         <p:cNvPr id="1" name=""/>
@@ -10514,7 +10885,7 @@
           <a:p>
             <a:r>
               <a:rPr lang="en-US" dirty="0"/>
-              <a:t>Command list Exercise</a:t>
+              <a:t>Using Dictionary as command list</a:t>
             </a:r>
           </a:p>
         </p:txBody>
@@ -10543,21 +10914,9 @@
         </p:spPr>
         <p:txBody>
           <a:bodyPr>
-            <a:normAutofit/>
+            <a:normAutofit lnSpcReduction="10000"/>
           </a:bodyPr>
           <a:lstStyle/>
-          <a:p>
-            <a:pPr marL="400050" lvl="1" indent="0">
-              <a:buNone/>
-            </a:pPr>
-            <a:r>
-              <a:rPr lang="en-US" sz="3200" b="1" dirty="0">
-                <a:latin typeface="Courier New" panose="02070309020205020404" pitchFamily="49" charset="0"/>
-                <a:cs typeface="Courier New" panose="02070309020205020404" pitchFamily="49" charset="0"/>
-              </a:rPr>
-              <a:t>exercises/dictionaries/</a:t>
-            </a:r>
-          </a:p>
           <a:p>
             <a:pPr marL="400050" lvl="1" indent="0">
               <a:buNone/>
@@ -10567,31 +10926,34 @@
                 <a:latin typeface="Courier New" panose="02070309020205020404" pitchFamily="49" charset="0"/>
                 <a:cs typeface="Courier New" panose="02070309020205020404" pitchFamily="49" charset="0"/>
               </a:rPr>
-              <a:t>commands_redo_1.py </a:t>
-            </a:r>
-            <a:r>
-              <a:rPr lang="en-US" sz="3200" dirty="0">
+              <a:t>commands = </a:t>
+            </a:r>
+            <a:r>
+              <a:rPr lang="en-US" sz="3200" b="1" dirty="0">
+                <a:solidFill>
+                  <a:srgbClr val="0070C0"/>
+                </a:solidFill>
                 <a:latin typeface="Courier New" panose="02070309020205020404" pitchFamily="49" charset="0"/>
                 <a:cs typeface="Courier New" panose="02070309020205020404" pitchFamily="49" charset="0"/>
-                <a:sym typeface="Wingdings" panose="05000000000000000000" pitchFamily="2" charset="2"/>
               </a:rPr>
-              <a:t> commands_redo_2.py</a:t>
-            </a:r>
-            <a:endParaRPr lang="en-US" sz="3200" dirty="0">
-              <a:latin typeface="Courier New" panose="02070309020205020404" pitchFamily="49" charset="0"/>
-              <a:cs typeface="Courier New" panose="02070309020205020404" pitchFamily="49" charset="0"/>
-            </a:endParaRPr>
-          </a:p>
-          <a:p>
-            <a:pPr marL="400050" lvl="1" indent="0">
-              <a:buNone/>
-            </a:pPr>
+              <a:t>{</a:t>
+            </a:r>
             <a:r>
               <a:rPr lang="en-US" sz="3200" dirty="0">
                 <a:latin typeface="Courier New" panose="02070309020205020404" pitchFamily="49" charset="0"/>
                 <a:cs typeface="Courier New" panose="02070309020205020404" pitchFamily="49" charset="0"/>
               </a:rPr>
-              <a:t>commands = {"up":1, "down":1, "left":1, "right":1}</a:t>
+              <a:t>"up":1, "down":1, "left":1, "right":1</a:t>
+            </a:r>
+            <a:r>
+              <a:rPr lang="en-US" sz="3200" b="1" dirty="0">
+                <a:solidFill>
+                  <a:srgbClr val="0070C0"/>
+                </a:solidFill>
+                <a:latin typeface="Courier New" panose="02070309020205020404" pitchFamily="49" charset="0"/>
+                <a:cs typeface="Courier New" panose="02070309020205020404" pitchFamily="49" charset="0"/>
+              </a:rPr>
+              <a:t>}</a:t>
             </a:r>
           </a:p>
           <a:p>
@@ -10603,22 +10965,89 @@
                 <a:latin typeface="Courier New" panose="02070309020205020404" pitchFamily="49" charset="0"/>
                 <a:cs typeface="Courier New" panose="02070309020205020404" pitchFamily="49" charset="0"/>
               </a:rPr>
-              <a:t>for inp in ["up", "down", "in", "out"]:</a:t>
-            </a:r>
-          </a:p>
-          <a:p>
-            <a:pPr marL="400050" lvl="1" indent="0">
-              <a:buNone/>
-            </a:pPr>
-            <a:r>
-              <a:rPr lang="en-US" sz="3200" dirty="0">
-                <a:solidFill>
-                  <a:srgbClr val="00B0F0"/>
+              <a:t>for inp in </a:t>
+            </a:r>
+            <a:r>
+              <a:rPr lang="en-US" sz="3200" b="1" dirty="0">
+                <a:solidFill>
+                  <a:srgbClr val="0070C0"/>
                 </a:solidFill>
                 <a:latin typeface="Courier New" panose="02070309020205020404" pitchFamily="49" charset="0"/>
                 <a:cs typeface="Courier New" panose="02070309020205020404" pitchFamily="49" charset="0"/>
               </a:rPr>
-              <a:t>Put in the checks for command in list/out of list</a:t>
+              <a:t>[</a:t>
+            </a:r>
+            <a:r>
+              <a:rPr lang="en-US" sz="3200" dirty="0">
+                <a:latin typeface="Courier New" panose="02070309020205020404" pitchFamily="49" charset="0"/>
+                <a:cs typeface="Courier New" panose="02070309020205020404" pitchFamily="49" charset="0"/>
+              </a:rPr>
+              <a:t>"up", "down", "in", "out"</a:t>
+            </a:r>
+            <a:r>
+              <a:rPr lang="en-US" sz="3200" b="1" dirty="0">
+                <a:solidFill>
+                  <a:srgbClr val="0070C0"/>
+                </a:solidFill>
+                <a:latin typeface="Courier New" panose="02070309020205020404" pitchFamily="49" charset="0"/>
+                <a:cs typeface="Courier New" panose="02070309020205020404" pitchFamily="49" charset="0"/>
+              </a:rPr>
+              <a:t>]</a:t>
+            </a:r>
+            <a:r>
+              <a:rPr lang="en-US" sz="3200" dirty="0">
+                <a:latin typeface="Courier New" panose="02070309020205020404" pitchFamily="49" charset="0"/>
+                <a:cs typeface="Courier New" panose="02070309020205020404" pitchFamily="49" charset="0"/>
+              </a:rPr>
+              <a:t>:</a:t>
+            </a:r>
+          </a:p>
+          <a:p>
+            <a:pPr marL="400050" lvl="1" indent="0">
+              <a:buNone/>
+            </a:pPr>
+            <a:r>
+              <a:rPr lang="en-US" sz="3200" dirty="0">
+                <a:latin typeface="Courier New" panose="02070309020205020404" pitchFamily="49" charset="0"/>
+                <a:cs typeface="Courier New" panose="02070309020205020404" pitchFamily="49" charset="0"/>
+              </a:rPr>
+              <a:t>    if inp in commands:</a:t>
+            </a:r>
+          </a:p>
+          <a:p>
+            <a:pPr marL="400050" lvl="1" indent="0">
+              <a:buNone/>
+            </a:pPr>
+            <a:r>
+              <a:rPr lang="en-US" sz="3200" dirty="0">
+                <a:latin typeface="Courier New" panose="02070309020205020404" pitchFamily="49" charset="0"/>
+                <a:cs typeface="Courier New" panose="02070309020205020404" pitchFamily="49" charset="0"/>
+              </a:rPr>
+              <a:t>        print("Do cmd:", inp)</a:t>
+            </a:r>
+          </a:p>
+          <a:p>
+            <a:pPr marL="400050" lvl="1" indent="0">
+              <a:buNone/>
+            </a:pPr>
+            <a:r>
+              <a:rPr lang="en-US" sz="3200" dirty="0">
+                <a:latin typeface="Courier New" panose="02070309020205020404" pitchFamily="49" charset="0"/>
+                <a:cs typeface="Courier New" panose="02070309020205020404" pitchFamily="49" charset="0"/>
+              </a:rPr>
+              <a:t>    else:</a:t>
+            </a:r>
+          </a:p>
+          <a:p>
+            <a:pPr marL="400050" lvl="1" indent="0">
+              <a:buNone/>
+            </a:pPr>
+            <a:r>
+              <a:rPr lang="en-US" sz="3200" dirty="0">
+                <a:latin typeface="Courier New" panose="02070309020205020404" pitchFamily="49" charset="0"/>
+                <a:cs typeface="Courier New" panose="02070309020205020404" pitchFamily="49" charset="0"/>
+              </a:rPr>
+              <a:t>        print("input:", inp, "not in:", commands)</a:t>
             </a:r>
           </a:p>
         </p:txBody>
@@ -10695,7 +11124,7 @@
                 <a:tabLst/>
                 <a:defRPr/>
               </a:pPr>
-              <a:t>7/13/2022</a:t>
+              <a:t>8/9/2022</a:t>
             </a:fld>
             <a:endParaRPr kumimoji="0" lang="en-US" sz="900" b="0" i="0" u="none" strike="noStrike" kern="1200" cap="none" spc="0" normalizeH="0" baseline="0" noProof="0" dirty="0">
               <a:ln>
@@ -10888,7 +11317,7 @@
     </p:spTree>
     <p:extLst>
       <p:ext uri="{BB962C8B-B14F-4D97-AF65-F5344CB8AC3E}">
-        <p14:creationId xmlns:p14="http://schemas.microsoft.com/office/powerpoint/2010/main" val="2815270121"/>
+        <p14:creationId xmlns:p14="http://schemas.microsoft.com/office/powerpoint/2010/main" val="3493103076"/>
       </p:ext>
     </p:extLst>
   </p:cSld>
@@ -10911,8 +11340,21 @@
 </file>
 
 <file path=ppt/slides/slide7.xml><?xml version="1.0" encoding="utf-8"?>
-<p:sld xmlns:a="http://schemas.openxmlformats.org/drawingml/2006/main" xmlns:r="http://schemas.openxmlformats.org/officeDocument/2006/relationships" xmlns:p="http://schemas.openxmlformats.org/presentationml/2006/main">
+<p:sld xmlns:a="http://schemas.openxmlformats.org/drawingml/2006/main" xmlns:r="http://schemas.openxmlformats.org/officeDocument/2006/relationships" xmlns:p="http://schemas.openxmlformats.org/presentationml/2006/main" showMasterSp="0">
   <p:cSld>
+    <p:bg>
+      <p:bgPr>
+        <a:pattFill prst="smConfetti">
+          <a:fgClr>
+            <a:schemeClr val="accent1"/>
+          </a:fgClr>
+          <a:bgClr>
+            <a:schemeClr val="bg1"/>
+          </a:bgClr>
+        </a:pattFill>
+        <a:effectLst/>
+      </p:bgPr>
+    </p:bg>
     <p:spTree>
       <p:nvGrpSpPr>
         <p:cNvPr id="1" name=""/>
@@ -10955,7 +11397,7 @@
           <a:p>
             <a:r>
               <a:rPr lang="en-US" dirty="0"/>
-              <a:t>Simple command example</a:t>
+              <a:t>Command list Exercise</a:t>
             </a:r>
           </a:p>
         </p:txBody>
@@ -10992,14 +11434,74 @@
               <a:buNone/>
             </a:pPr>
             <a:r>
-              <a:rPr lang="en-US" sz="3200" dirty="0">
-                <a:solidFill>
-                  <a:srgbClr val="00B0F0"/>
-                </a:solidFill>
+              <a:rPr lang="en-US" sz="3200" b="1" dirty="0">
                 <a:latin typeface="Courier New" panose="02070309020205020404" pitchFamily="49" charset="0"/>
                 <a:cs typeface="Courier New" panose="02070309020205020404" pitchFamily="49" charset="0"/>
               </a:rPr>
-              <a:t>exercises/dictionaries/motion.py</a:t>
+              <a:t>exercises/dictionaries/</a:t>
+            </a:r>
+          </a:p>
+          <a:p>
+            <a:pPr marL="400050" lvl="1" indent="0">
+              <a:buNone/>
+            </a:pPr>
+            <a:r>
+              <a:rPr lang="en-US" sz="3200" dirty="0">
+                <a:latin typeface="Courier New" panose="02070309020205020404" pitchFamily="49" charset="0"/>
+                <a:cs typeface="Courier New" panose="02070309020205020404" pitchFamily="49" charset="0"/>
+              </a:rPr>
+              <a:t>commands_redo_1.py </a:t>
+            </a:r>
+            <a:r>
+              <a:rPr lang="en-US" sz="3200" dirty="0">
+                <a:latin typeface="Courier New" panose="02070309020205020404" pitchFamily="49" charset="0"/>
+                <a:cs typeface="Courier New" panose="02070309020205020404" pitchFamily="49" charset="0"/>
+                <a:sym typeface="Wingdings" panose="05000000000000000000" pitchFamily="2" charset="2"/>
+              </a:rPr>
+              <a:t> commands_redo_2.py</a:t>
+            </a:r>
+            <a:endParaRPr lang="en-US" sz="3200" dirty="0">
+              <a:latin typeface="Courier New" panose="02070309020205020404" pitchFamily="49" charset="0"/>
+              <a:cs typeface="Courier New" panose="02070309020205020404" pitchFamily="49" charset="0"/>
+            </a:endParaRPr>
+          </a:p>
+          <a:p>
+            <a:pPr marL="400050" lvl="1" indent="0">
+              <a:buNone/>
+            </a:pPr>
+            <a:r>
+              <a:rPr lang="en-US" sz="3200" dirty="0">
+                <a:latin typeface="Courier New" panose="02070309020205020404" pitchFamily="49" charset="0"/>
+                <a:cs typeface="Courier New" panose="02070309020205020404" pitchFamily="49" charset="0"/>
+              </a:rPr>
+              <a:t>commands = {"up":1, "down":1, "left":1, "right":1}</a:t>
+            </a:r>
+          </a:p>
+          <a:p>
+            <a:pPr marL="400050" lvl="1" indent="0">
+              <a:buNone/>
+            </a:pPr>
+            <a:r>
+              <a:rPr lang="en-US" sz="3200" dirty="0">
+                <a:latin typeface="Courier New" panose="02070309020205020404" pitchFamily="49" charset="0"/>
+                <a:cs typeface="Courier New" panose="02070309020205020404" pitchFamily="49" charset="0"/>
+              </a:rPr>
+              <a:t>for inp in ["up", "down", "in", "out"]:</a:t>
+            </a:r>
+          </a:p>
+          <a:p>
+            <a:pPr marL="400050" lvl="1" indent="0">
+              <a:buNone/>
+            </a:pPr>
+            <a:r>
+              <a:rPr lang="en-US" sz="3200" dirty="0">
+                <a:solidFill>
+                  <a:srgbClr val="00B0F0"/>
+                </a:solidFill>
+                <a:latin typeface="Courier New" panose="02070309020205020404" pitchFamily="49" charset="0"/>
+                <a:cs typeface="Courier New" panose="02070309020205020404" pitchFamily="49" charset="0"/>
+              </a:rPr>
+              <a:t>Put in the checks for command in list/out of list</a:t>
             </a:r>
           </a:p>
         </p:txBody>
@@ -11076,7 +11578,7 @@
                 <a:tabLst/>
                 <a:defRPr/>
               </a:pPr>
-              <a:t>7/13/2022</a:t>
+              <a:t>8/9/2022</a:t>
             </a:fld>
             <a:endParaRPr kumimoji="0" lang="en-US" sz="900" b="0" i="0" u="none" strike="noStrike" kern="1200" cap="none" spc="0" normalizeH="0" baseline="0" noProof="0" dirty="0">
               <a:ln>
@@ -11172,24 +11674,7 @@
                 <a:ea typeface="+mn-ea"/>
                 <a:cs typeface="+mn-cs"/>
               </a:rPr>
-              <a:t>	</a:t>
-            </a:r>
-            <a:r>
-              <a:rPr kumimoji="0" lang="en-US" sz="900" b="0" i="0" u="none" strike="noStrike" kern="1200" cap="none" spc="0" normalizeH="0" baseline="0" noProof="0" dirty="0">
-                <a:ln>
-                  <a:noFill/>
-                </a:ln>
-                <a:solidFill>
-                  <a:schemeClr val="accent1"/>
-                </a:solidFill>
-                <a:effectLst/>
-                <a:uLnTx/>
-                <a:uFillTx/>
-                <a:latin typeface="Trebuchet MS" panose="020B0603020202020204"/>
-                <a:ea typeface="+mn-ea"/>
-                <a:cs typeface="+mn-cs"/>
-              </a:rPr>
-              <a:t>Session #4   Dictionaries</a:t>
+              <a:t>	Session #4   Dictionaries</a:t>
             </a:r>
           </a:p>
         </p:txBody>
@@ -11286,7 +11771,7 @@
     </p:spTree>
     <p:extLst>
       <p:ext uri="{BB962C8B-B14F-4D97-AF65-F5344CB8AC3E}">
-        <p14:creationId xmlns:p14="http://schemas.microsoft.com/office/powerpoint/2010/main" val="1263726541"/>
+        <p14:creationId xmlns:p14="http://schemas.microsoft.com/office/powerpoint/2010/main" val="2815270121"/>
       </p:ext>
     </p:extLst>
   </p:cSld>
@@ -11330,7 +11815,7 @@
           <p:cNvPr id="2" name="Title 1">
             <a:extLst>
               <a:ext uri="{FF2B5EF4-FFF2-40B4-BE49-F238E27FC236}">
-                <a16:creationId xmlns:a16="http://schemas.microsoft.com/office/drawing/2014/main" id="{8E8C36EC-DEF9-429E-AF7C-077A23A7A195}"/>
+                <a16:creationId xmlns:a16="http://schemas.microsoft.com/office/drawing/2014/main" id="{9E6A877F-A718-47D6-828D-F14357B0EE64}"/>
               </a:ext>
             </a:extLst>
           </p:cNvPr>
@@ -11341,14 +11826,19 @@
             <p:ph type="title"/>
           </p:nvPr>
         </p:nvSpPr>
-        <p:spPr/>
+        <p:spPr>
+          <a:xfrm>
+            <a:off x="677334" y="609600"/>
+            <a:ext cx="8596668" cy="906966"/>
+          </a:xfrm>
+        </p:spPr>
         <p:txBody>
           <a:bodyPr/>
           <a:lstStyle/>
           <a:p>
             <a:r>
               <a:rPr lang="en-US" dirty="0"/>
-              <a:t>Review Dictionary in use Example</a:t>
+              <a:t>Simple command example</a:t>
             </a:r>
           </a:p>
         </p:txBody>
@@ -11358,7 +11848,7 @@
           <p:cNvPr id="3" name="Content Placeholder 2">
             <a:extLst>
               <a:ext uri="{FF2B5EF4-FFF2-40B4-BE49-F238E27FC236}">
-                <a16:creationId xmlns:a16="http://schemas.microsoft.com/office/drawing/2014/main" id="{70710FEB-8AEB-4AC5-BBC2-D18A2497D9E6}"/>
+                <a16:creationId xmlns:a16="http://schemas.microsoft.com/office/drawing/2014/main" id="{64372DD4-6DBF-43CC-8728-9C2DC16B0267}"/>
               </a:ext>
             </a:extLst>
           </p:cNvPr>
@@ -11369,111 +11859,316 @@
             <p:ph idx="1"/>
           </p:nvPr>
         </p:nvSpPr>
-        <p:spPr/>
+        <p:spPr>
+          <a:xfrm>
+            <a:off x="-423745" y="1516567"/>
+            <a:ext cx="10682867" cy="4524796"/>
+          </a:xfrm>
+        </p:spPr>
         <p:txBody>
           <a:bodyPr>
             <a:normAutofit/>
           </a:bodyPr>
           <a:lstStyle/>
           <a:p>
-            <a:pPr marL="57150" indent="0">
+            <a:pPr marL="400050" lvl="1" indent="0">
               <a:buNone/>
             </a:pPr>
             <a:r>
-              <a:rPr lang="en-US" sz="3600" dirty="0"/>
-              <a:t>fireworks.py</a:t>
-            </a:r>
-          </a:p>
-          <a:p>
-            <a:pPr marL="57150" indent="0">
-              <a:buNone/>
-            </a:pPr>
-            <a:r>
-              <a:rPr lang="en-US" sz="3600" dirty="0"/>
-              <a:t>Random Balls</a:t>
-            </a:r>
-          </a:p>
-          <a:p>
-            <a:pPr>
-              <a:spcBef>
-                <a:spcPts val="600"/>
-              </a:spcBef>
-            </a:pPr>
-            <a:r>
-              <a:rPr lang="en-US" sz="3600" dirty="0">
-                <a:effectLst/>
-                <a:latin typeface="Calibri" panose="020F0502020204030204" pitchFamily="34" charset="0"/>
-                <a:ea typeface="Calibri" panose="020F0502020204030204" pitchFamily="34" charset="0"/>
-                <a:cs typeface="Times New Roman" panose="02020603050405020304" pitchFamily="18" charset="0"/>
+              <a:rPr lang="en-US" sz="3200" dirty="0">
+                <a:solidFill>
+                  <a:srgbClr val="00B0F0"/>
+                </a:solidFill>
+                <a:latin typeface="Courier New" panose="02070309020205020404" pitchFamily="49" charset="0"/>
+                <a:cs typeface="Courier New" panose="02070309020205020404" pitchFamily="49" charset="0"/>
               </a:rPr>
-              <a:t>Created randomly</a:t>
-            </a:r>
-          </a:p>
-          <a:p>
-            <a:pPr>
+              <a:t>exercises/dictionaries/motion.py</a:t>
+            </a:r>
+          </a:p>
+          <a:p>
+            <a:pPr marL="857250" lvl="1" indent="-457200"/>
+            <a:r>
+              <a:rPr lang="en-US" sz="3200" dirty="0">
+                <a:solidFill>
+                  <a:schemeClr val="accent1"/>
+                </a:solidFill>
+                <a:latin typeface="Tahoma" panose="020B0604030504040204" pitchFamily="34" charset="0"/>
+                <a:ea typeface="Tahoma" panose="020B0604030504040204" pitchFamily="34" charset="0"/>
+                <a:cs typeface="Tahoma" panose="020B0604030504040204" pitchFamily="34" charset="0"/>
+              </a:rPr>
+              <a:t>Simple motion game, using characters</a:t>
+            </a:r>
+          </a:p>
+          <a:p>
+            <a:pPr marL="857250" lvl="1" indent="-457200"/>
+            <a:r>
+              <a:rPr lang="en-US" sz="3200" dirty="0">
+                <a:solidFill>
+                  <a:schemeClr val="accent1"/>
+                </a:solidFill>
+                <a:latin typeface="Tahoma" panose="020B0604030504040204" pitchFamily="34" charset="0"/>
+                <a:ea typeface="Tahoma" panose="020B0604030504040204" pitchFamily="34" charset="0"/>
+                <a:cs typeface="Tahoma" panose="020B0604030504040204" pitchFamily="34" charset="0"/>
+              </a:rPr>
+              <a:t>Play along</a:t>
+            </a:r>
+          </a:p>
+          <a:p>
+            <a:pPr marL="857250" lvl="1" indent="-457200"/>
+            <a:r>
+              <a:rPr lang="en-US" sz="3200" dirty="0">
+                <a:solidFill>
+                  <a:schemeClr val="accent1"/>
+                </a:solidFill>
+                <a:latin typeface="Tahoma" panose="020B0604030504040204" pitchFamily="34" charset="0"/>
+                <a:ea typeface="Tahoma" panose="020B0604030504040204" pitchFamily="34" charset="0"/>
+                <a:cs typeface="Tahoma" panose="020B0604030504040204" pitchFamily="34" charset="0"/>
+              </a:rPr>
+              <a:t>Field updated </a:t>
+            </a:r>
+            <a:r>
+              <a:rPr lang="en-US" sz="3200">
+                <a:solidFill>
+                  <a:schemeClr val="accent1"/>
+                </a:solidFill>
+                <a:latin typeface="Tahoma" panose="020B0604030504040204" pitchFamily="34" charset="0"/>
+                <a:ea typeface="Tahoma" panose="020B0604030504040204" pitchFamily="34" charset="0"/>
+                <a:cs typeface="Tahoma" panose="020B0604030504040204" pitchFamily="34" charset="0"/>
+              </a:rPr>
+              <a:t>each move</a:t>
+            </a:r>
+            <a:endParaRPr lang="en-US" sz="3200" dirty="0">
+              <a:solidFill>
+                <a:schemeClr val="accent1"/>
+              </a:solidFill>
+              <a:latin typeface="Tahoma" panose="020B0604030504040204" pitchFamily="34" charset="0"/>
+              <a:ea typeface="Tahoma" panose="020B0604030504040204" pitchFamily="34" charset="0"/>
+              <a:cs typeface="Tahoma" panose="020B0604030504040204" pitchFamily="34" charset="0"/>
+            </a:endParaRPr>
+          </a:p>
+          <a:p>
+            <a:pPr marL="857250" lvl="1" indent="-457200"/>
+            <a:r>
+              <a:rPr lang="en-US" sz="3200" dirty="0">
+                <a:solidFill>
+                  <a:schemeClr val="accent1"/>
+                </a:solidFill>
+                <a:latin typeface="Tahoma" panose="020B0604030504040204" pitchFamily="34" charset="0"/>
+                <a:ea typeface="Tahoma" panose="020B0604030504040204" pitchFamily="34" charset="0"/>
+                <a:cs typeface="Tahoma" panose="020B0604030504040204" pitchFamily="34" charset="0"/>
+              </a:rPr>
+              <a:t>Commands are in a dictionary</a:t>
+            </a:r>
+          </a:p>
+          <a:p>
+            <a:pPr marL="857250" lvl="1" indent="-457200"/>
+            <a:endParaRPr lang="en-US" sz="3200" dirty="0">
+              <a:solidFill>
+                <a:schemeClr val="accent1"/>
+              </a:solidFill>
+              <a:latin typeface="Tahoma" panose="020B0604030504040204" pitchFamily="34" charset="0"/>
+              <a:ea typeface="Tahoma" panose="020B0604030504040204" pitchFamily="34" charset="0"/>
+              <a:cs typeface="Tahoma" panose="020B0604030504040204" pitchFamily="34" charset="0"/>
+            </a:endParaRPr>
+          </a:p>
+        </p:txBody>
+      </p:sp>
+      <p:sp>
+        <p:nvSpPr>
+          <p:cNvPr id="4" name="Date Placeholder 3">
+            <a:extLst>
+              <a:ext uri="{FF2B5EF4-FFF2-40B4-BE49-F238E27FC236}">
+                <a16:creationId xmlns:a16="http://schemas.microsoft.com/office/drawing/2014/main" id="{7DBC778F-46A9-469B-AFCA-A7F523273D3A}"/>
+              </a:ext>
+            </a:extLst>
+          </p:cNvPr>
+          <p:cNvSpPr>
+            <a:spLocks noGrp="1"/>
+          </p:cNvSpPr>
+          <p:nvPr>
+            <p:ph type="dt" sz="half" idx="10"/>
+          </p:nvPr>
+        </p:nvSpPr>
+        <p:spPr/>
+        <p:txBody>
+          <a:bodyPr/>
+          <a:lstStyle/>
+          <a:p>
+            <a:pPr marL="0" marR="0" lvl="0" indent="0" algn="r" defTabSz="457200" rtl="0" eaLnBrk="1" fontAlgn="auto" latinLnBrk="0" hangingPunct="1">
+              <a:lnSpc>
+                <a:spcPct val="100000"/>
+              </a:lnSpc>
               <a:spcBef>
                 <a:spcPts val="0"/>
               </a:spcBef>
+              <a:spcAft>
+                <a:spcPts val="0"/>
+              </a:spcAft>
+              <a:buClrTx/>
+              <a:buSzTx/>
+              <a:buFontTx/>
+              <a:buNone/>
+              <a:tabLst/>
+              <a:defRPr/>
             </a:pPr>
-            <a:r>
-              <a:rPr lang="en-US" sz="3600" dirty="0">
+            <a:fld id="{A7119916-CD40-456D-ABE3-55F8822671F7}" type="datetime1">
+              <a:rPr kumimoji="0" lang="en-US" sz="900" b="0" i="0" u="none" strike="noStrike" kern="1200" cap="none" spc="0" normalizeH="0" baseline="0" noProof="0" smtClean="0">
+                <a:ln>
+                  <a:noFill/>
+                </a:ln>
+                <a:solidFill>
+                  <a:prstClr val="black">
+                    <a:tint val="75000"/>
+                  </a:prstClr>
+                </a:solidFill>
                 <a:effectLst/>
-                <a:latin typeface="Calibri" panose="020F0502020204030204" pitchFamily="34" charset="0"/>
-                <a:ea typeface="Calibri" panose="020F0502020204030204" pitchFamily="34" charset="0"/>
-                <a:cs typeface="Times New Roman" panose="02020603050405020304" pitchFamily="18" charset="0"/>
+                <a:uLnTx/>
+                <a:uFillTx/>
+                <a:latin typeface="Trebuchet MS" panose="020B0603020202020204"/>
+                <a:ea typeface="+mn-ea"/>
+                <a:cs typeface="+mn-cs"/>
               </a:rPr>
-              <a:t>Die when hitting the edge</a:t>
-            </a:r>
-          </a:p>
-          <a:p>
-            <a:pPr>
+              <a:pPr marL="0" marR="0" lvl="0" indent="0" algn="r" defTabSz="457200" rtl="0" eaLnBrk="1" fontAlgn="auto" latinLnBrk="0" hangingPunct="1">
+                <a:lnSpc>
+                  <a:spcPct val="100000"/>
+                </a:lnSpc>
+                <a:spcBef>
+                  <a:spcPts val="0"/>
+                </a:spcBef>
+                <a:spcAft>
+                  <a:spcPts val="0"/>
+                </a:spcAft>
+                <a:buClrTx/>
+                <a:buSzTx/>
+                <a:buFontTx/>
+                <a:buNone/>
+                <a:tabLst/>
+                <a:defRPr/>
+              </a:pPr>
+              <a:t>8/9/2022</a:t>
+            </a:fld>
+            <a:endParaRPr kumimoji="0" lang="en-US" sz="900" b="0" i="0" u="none" strike="noStrike" kern="1200" cap="none" spc="0" normalizeH="0" baseline="0" noProof="0" dirty="0">
+              <a:ln>
+                <a:noFill/>
+              </a:ln>
+              <a:solidFill>
+                <a:prstClr val="black">
+                  <a:tint val="75000"/>
+                </a:prstClr>
+              </a:solidFill>
+              <a:effectLst/>
+              <a:uLnTx/>
+              <a:uFillTx/>
+              <a:latin typeface="Trebuchet MS" panose="020B0603020202020204"/>
+              <a:ea typeface="+mn-ea"/>
+              <a:cs typeface="+mn-cs"/>
+            </a:endParaRPr>
+          </a:p>
+        </p:txBody>
+      </p:sp>
+      <p:sp>
+        <p:nvSpPr>
+          <p:cNvPr id="5" name="Footer Placeholder 4">
+            <a:extLst>
+              <a:ext uri="{FF2B5EF4-FFF2-40B4-BE49-F238E27FC236}">
+                <a16:creationId xmlns:a16="http://schemas.microsoft.com/office/drawing/2014/main" id="{4351A704-7B25-4E2E-AEDE-6CB83EBFD759}"/>
+              </a:ext>
+            </a:extLst>
+          </p:cNvPr>
+          <p:cNvSpPr>
+            <a:spLocks noGrp="1"/>
+          </p:cNvSpPr>
+          <p:nvPr>
+            <p:ph type="ftr" sz="quarter" idx="11"/>
+          </p:nvPr>
+        </p:nvSpPr>
+        <p:spPr/>
+        <p:txBody>
+          <a:bodyPr/>
+          <a:lstStyle/>
+          <a:p>
+            <a:pPr marL="0" marR="0" lvl="0" indent="0" algn="l" defTabSz="457200" rtl="0" eaLnBrk="1" fontAlgn="auto" latinLnBrk="0" hangingPunct="1">
+              <a:lnSpc>
+                <a:spcPct val="100000"/>
+              </a:lnSpc>
               <a:spcBef>
                 <a:spcPts val="0"/>
               </a:spcBef>
+              <a:spcAft>
+                <a:spcPts val="0"/>
+              </a:spcAft>
+              <a:buClrTx/>
+              <a:buSzTx/>
+              <a:buFontTx/>
+              <a:buNone/>
+              <a:tabLst/>
+              <a:defRPr/>
             </a:pPr>
             <a:r>
-              <a:rPr lang="en-US" sz="3600" dirty="0">
-                <a:latin typeface="Calibri" panose="020F0502020204030204" pitchFamily="34" charset="0"/>
-                <a:ea typeface="Calibri" panose="020F0502020204030204" pitchFamily="34" charset="0"/>
-                <a:cs typeface="Times New Roman" panose="02020603050405020304" pitchFamily="18" charset="0"/>
+              <a:rPr kumimoji="0" lang="en-US" sz="900" b="0" i="0" u="none" strike="noStrike" kern="1200" cap="none" spc="0" normalizeH="0" baseline="0" noProof="0" dirty="0">
+                <a:ln>
+                  <a:noFill/>
+                </a:ln>
+                <a:solidFill>
+                  <a:prstClr val="black">
+                    <a:tint val="75000"/>
+                  </a:prstClr>
+                </a:solidFill>
+                <a:effectLst/>
+                <a:uLnTx/>
+                <a:uFillTx/>
+                <a:latin typeface="Trebuchet MS" panose="020B0603020202020204"/>
+                <a:ea typeface="+mn-ea"/>
+                <a:cs typeface="+mn-cs"/>
+                <a:hlinkClick r:id="rId3"/>
               </a:rPr>
-              <a:t>Looping via turtle </a:t>
-            </a:r>
-            <a:r>
-              <a:rPr lang="en-US" sz="3600" dirty="0" err="1">
-                <a:latin typeface="Calibri" panose="020F0502020204030204" pitchFamily="34" charset="0"/>
-                <a:ea typeface="Calibri" panose="020F0502020204030204" pitchFamily="34" charset="0"/>
-                <a:cs typeface="Times New Roman" panose="02020603050405020304" pitchFamily="18" charset="0"/>
+              <a:t>raysmith@alum.mit.edu</a:t>
+            </a:r>
+            <a:r>
+              <a:rPr kumimoji="0" lang="en-US" sz="900" b="0" i="0" u="none" strike="noStrike" kern="1200" cap="none" spc="0" normalizeH="0" baseline="0" noProof="0" dirty="0">
+                <a:ln>
+                  <a:noFill/>
+                </a:ln>
+                <a:solidFill>
+                  <a:prstClr val="black">
+                    <a:tint val="75000"/>
+                  </a:prstClr>
+                </a:solidFill>
+                <a:effectLst/>
+                <a:uLnTx/>
+                <a:uFillTx/>
+                <a:latin typeface="Trebuchet MS" panose="020B0603020202020204"/>
+                <a:ea typeface="+mn-ea"/>
+                <a:cs typeface="+mn-cs"/>
               </a:rPr>
-              <a:t>ontimer</a:t>
-            </a:r>
-            <a:r>
-              <a:rPr lang="en-US" sz="3600" dirty="0">
-                <a:latin typeface="Calibri" panose="020F0502020204030204" pitchFamily="34" charset="0"/>
-                <a:ea typeface="Calibri" panose="020F0502020204030204" pitchFamily="34" charset="0"/>
-                <a:cs typeface="Times New Roman" panose="02020603050405020304" pitchFamily="18" charset="0"/>
+              <a:t>	</a:t>
+            </a:r>
+            <a:r>
+              <a:rPr kumimoji="0" lang="en-US" sz="900" b="0" i="0" u="none" strike="noStrike" kern="1200" cap="none" spc="0" normalizeH="0" baseline="0" noProof="0" dirty="0">
+                <a:ln>
+                  <a:noFill/>
+                </a:ln>
+                <a:solidFill>
+                  <a:schemeClr val="accent1"/>
+                </a:solidFill>
+                <a:effectLst/>
+                <a:uLnTx/>
+                <a:uFillTx/>
+                <a:latin typeface="Trebuchet MS" panose="020B0603020202020204"/>
+                <a:ea typeface="+mn-ea"/>
+                <a:cs typeface="+mn-cs"/>
               </a:rPr>
-              <a:t>() calls</a:t>
-            </a:r>
-            <a:endParaRPr lang="en-US" sz="3600" dirty="0">
-              <a:effectLst/>
-              <a:latin typeface="Calibri" panose="020F0502020204030204" pitchFamily="34" charset="0"/>
-              <a:ea typeface="Calibri" panose="020F0502020204030204" pitchFamily="34" charset="0"/>
-              <a:cs typeface="Times New Roman" panose="02020603050405020304" pitchFamily="18" charset="0"/>
-            </a:endParaRPr>
-          </a:p>
-          <a:p>
-            <a:pPr lvl="1"/>
-            <a:endParaRPr lang="en-US" sz="3400" dirty="0"/>
-          </a:p>
-        </p:txBody>
-      </p:sp>
-      <p:sp>
-        <p:nvSpPr>
-          <p:cNvPr id="4" name="Date Placeholder 3">
+              <a:t>Session #4   Dictionaries</a:t>
+            </a:r>
+          </a:p>
+        </p:txBody>
+      </p:sp>
+      <p:sp>
+        <p:nvSpPr>
+          <p:cNvPr id="6" name="Slide Number Placeholder 5">
             <a:extLst>
               <a:ext uri="{FF2B5EF4-FFF2-40B4-BE49-F238E27FC236}">
-                <a16:creationId xmlns:a16="http://schemas.microsoft.com/office/drawing/2014/main" id="{5FDA8CFC-99B6-4BC1-B744-86BA7FCF6EFC}"/>
+                <a16:creationId xmlns:a16="http://schemas.microsoft.com/office/drawing/2014/main" id="{56C88A13-9CB2-48B8-A37E-911D446CDA3D}"/>
               </a:ext>
             </a:extLst>
           </p:cNvPr>
@@ -11481,103 +12176,104 @@
             <a:spLocks noGrp="1"/>
           </p:cNvSpPr>
           <p:nvPr>
-            <p:ph type="dt" sz="half" idx="10"/>
-          </p:nvPr>
-        </p:nvSpPr>
-        <p:spPr/>
-        <p:txBody>
-          <a:bodyPr/>
-          <a:lstStyle/>
-          <a:p>
-            <a:fld id="{A7119916-CD40-456D-ABE3-55F8822671F7}" type="datetime1">
-              <a:rPr lang="en-US" smtClean="0"/>
-              <a:t>7/13/2022</a:t>
-            </a:fld>
-            <a:endParaRPr lang="en-US" dirty="0"/>
-          </a:p>
-        </p:txBody>
-      </p:sp>
-      <p:sp>
-        <p:nvSpPr>
-          <p:cNvPr id="5" name="Footer Placeholder 4">
-            <a:extLst>
-              <a:ext uri="{FF2B5EF4-FFF2-40B4-BE49-F238E27FC236}">
-                <a16:creationId xmlns:a16="http://schemas.microsoft.com/office/drawing/2014/main" id="{D516A5E1-E20A-49CB-8946-8560B81B2019}"/>
-              </a:ext>
-            </a:extLst>
-          </p:cNvPr>
-          <p:cNvSpPr>
-            <a:spLocks noGrp="1"/>
-          </p:cNvSpPr>
-          <p:nvPr>
-            <p:ph type="ftr" sz="quarter" idx="11"/>
-          </p:nvPr>
-        </p:nvSpPr>
-        <p:spPr/>
-        <p:txBody>
-          <a:bodyPr/>
-          <a:lstStyle/>
-          <a:p>
-            <a:r>
-              <a:rPr lang="en-US" dirty="0">
-                <a:hlinkClick r:id="rId2"/>
+            <p:ph type="sldNum" sz="quarter" idx="12"/>
+          </p:nvPr>
+        </p:nvSpPr>
+        <p:spPr/>
+        <p:txBody>
+          <a:bodyPr/>
+          <a:lstStyle/>
+          <a:p>
+            <a:pPr marL="0" marR="0" lvl="0" indent="0" algn="r" defTabSz="457200" rtl="0" eaLnBrk="1" fontAlgn="auto" latinLnBrk="0" hangingPunct="1">
+              <a:lnSpc>
+                <a:spcPct val="100000"/>
+              </a:lnSpc>
+              <a:spcBef>
+                <a:spcPts val="0"/>
+              </a:spcBef>
+              <a:spcAft>
+                <a:spcPts val="0"/>
+              </a:spcAft>
+              <a:buClrTx/>
+              <a:buSzTx/>
+              <a:buFontTx/>
+              <a:buNone/>
+              <a:tabLst/>
+              <a:defRPr/>
+            </a:pPr>
+            <a:fld id="{6D22F896-40B5-4ADD-8801-0D06FADFA095}" type="slidenum">
+              <a:rPr kumimoji="0" lang="en-US" sz="900" b="0" i="0" u="none" strike="noStrike" kern="1200" cap="none" spc="0" normalizeH="0" baseline="0" noProof="0" smtClean="0">
+                <a:ln>
+                  <a:noFill/>
+                </a:ln>
+                <a:solidFill>
+                  <a:srgbClr val="90C226"/>
+                </a:solidFill>
+                <a:effectLst/>
+                <a:uLnTx/>
+                <a:uFillTx/>
+                <a:latin typeface="Trebuchet MS" panose="020B0603020202020204"/>
+                <a:ea typeface="+mn-ea"/>
+                <a:cs typeface="+mn-cs"/>
               </a:rPr>
-              <a:t>raysmith@alum.mit.edu</a:t>
-            </a:r>
-            <a:r>
-              <a:rPr lang="en-US" dirty="0"/>
-              <a:t>	</a:t>
-            </a:r>
-            <a:r>
-              <a:rPr lang="en-US" dirty="0">
-                <a:solidFill>
-                  <a:schemeClr val="accent1"/>
-                </a:solidFill>
-              </a:rPr>
-              <a:t>Session #4   Dictionaries</a:t>
-            </a:r>
-          </a:p>
-        </p:txBody>
-      </p:sp>
-      <p:sp>
-        <p:nvSpPr>
-          <p:cNvPr id="6" name="Slide Number Placeholder 5">
-            <a:extLst>
-              <a:ext uri="{FF2B5EF4-FFF2-40B4-BE49-F238E27FC236}">
-                <a16:creationId xmlns:a16="http://schemas.microsoft.com/office/drawing/2014/main" id="{527D6DAD-9E1F-4636-8B21-D6DC1643ACA0}"/>
-              </a:ext>
-            </a:extLst>
-          </p:cNvPr>
-          <p:cNvSpPr>
-            <a:spLocks noGrp="1"/>
-          </p:cNvSpPr>
-          <p:nvPr>
-            <p:ph type="sldNum" sz="quarter" idx="12"/>
-          </p:nvPr>
-        </p:nvSpPr>
-        <p:spPr/>
-        <p:txBody>
-          <a:bodyPr/>
-          <a:lstStyle/>
-          <a:p>
-            <a:fld id="{6D22F896-40B5-4ADD-8801-0D06FADFA095}" type="slidenum">
-              <a:rPr lang="en-US" smtClean="0"/>
+              <a:pPr marL="0" marR="0" lvl="0" indent="0" algn="r" defTabSz="457200" rtl="0" eaLnBrk="1" fontAlgn="auto" latinLnBrk="0" hangingPunct="1">
+                <a:lnSpc>
+                  <a:spcPct val="100000"/>
+                </a:lnSpc>
+                <a:spcBef>
+                  <a:spcPts val="0"/>
+                </a:spcBef>
+                <a:spcAft>
+                  <a:spcPts val="0"/>
+                </a:spcAft>
+                <a:buClrTx/>
+                <a:buSzTx/>
+                <a:buFontTx/>
+                <a:buNone/>
+                <a:tabLst/>
+                <a:defRPr/>
+              </a:pPr>
               <a:t>8</a:t>
             </a:fld>
-            <a:endParaRPr lang="en-US" dirty="0"/>
+            <a:endParaRPr kumimoji="0" lang="en-US" sz="900" b="0" i="0" u="none" strike="noStrike" kern="1200" cap="none" spc="0" normalizeH="0" baseline="0" noProof="0" dirty="0">
+              <a:ln>
+                <a:noFill/>
+              </a:ln>
+              <a:solidFill>
+                <a:srgbClr val="90C226"/>
+              </a:solidFill>
+              <a:effectLst/>
+              <a:uLnTx/>
+              <a:uFillTx/>
+              <a:latin typeface="Trebuchet MS" panose="020B0603020202020204"/>
+              <a:ea typeface="+mn-ea"/>
+              <a:cs typeface="+mn-cs"/>
+            </a:endParaRPr>
           </a:p>
         </p:txBody>
       </p:sp>
     </p:spTree>
     <p:extLst>
       <p:ext uri="{BB962C8B-B14F-4D97-AF65-F5344CB8AC3E}">
-        <p14:creationId xmlns:p14="http://schemas.microsoft.com/office/powerpoint/2010/main" val="3772226206"/>
+        <p14:creationId xmlns:p14="http://schemas.microsoft.com/office/powerpoint/2010/main" val="1263726541"/>
       </p:ext>
     </p:extLst>
   </p:cSld>
   <p:clrMapOvr>
     <a:masterClrMapping/>
   </p:clrMapOvr>
+  <mc:AlternateContent xmlns:mc="http://schemas.openxmlformats.org/markup-compatibility/2006" xmlns:p14="http://schemas.microsoft.com/office/powerpoint/2010/main">
+    <mc:Choice Requires="p14">
+      <p:transition spd="med" p14:dur="700">
+        <p:fade/>
+      </p:transition>
+    </mc:Choice>
+    <mc:Fallback xmlns="">
+      <p:transition spd="med">
+        <p:fade/>
+      </p:transition>
+    </mc:Fallback>
+  </mc:AlternateContent>
 </p:sld>
 </file>
 
@@ -11603,7 +12299,7 @@
           <p:cNvPr id="2" name="Title 1">
             <a:extLst>
               <a:ext uri="{FF2B5EF4-FFF2-40B4-BE49-F238E27FC236}">
-                <a16:creationId xmlns:a16="http://schemas.microsoft.com/office/drawing/2014/main" id="{F7E90694-AA7F-451B-A875-1D23D1FDBA32}"/>
+                <a16:creationId xmlns:a16="http://schemas.microsoft.com/office/drawing/2014/main" id="{976EEB39-4209-4653-8733-552200593C5C}"/>
               </a:ext>
             </a:extLst>
           </p:cNvPr>
@@ -11614,21 +12310,102 @@
             <p:ph type="title"/>
           </p:nvPr>
         </p:nvSpPr>
-        <p:spPr>
-          <a:xfrm>
-            <a:off x="955892" y="2723015"/>
-            <a:ext cx="8596668" cy="1320800"/>
-          </a:xfrm>
-        </p:spPr>
+        <p:spPr/>
+        <p:txBody>
+          <a:bodyPr/>
+          <a:lstStyle/>
+          <a:p>
+            <a:r>
+              <a:rPr lang="en-US" dirty="0"/>
+              <a:t>motion.py - outline</a:t>
+            </a:r>
+          </a:p>
+        </p:txBody>
+      </p:sp>
+      <p:sp>
+        <p:nvSpPr>
+          <p:cNvPr id="3" name="Content Placeholder 2">
+            <a:extLst>
+              <a:ext uri="{FF2B5EF4-FFF2-40B4-BE49-F238E27FC236}">
+                <a16:creationId xmlns:a16="http://schemas.microsoft.com/office/drawing/2014/main" id="{7B716BE9-9A92-79F8-48A1-D0189D351D92}"/>
+              </a:ext>
+            </a:extLst>
+          </p:cNvPr>
+          <p:cNvSpPr>
+            <a:spLocks noGrp="1"/>
+          </p:cNvSpPr>
+          <p:nvPr>
+            <p:ph idx="1"/>
+          </p:nvPr>
+        </p:nvSpPr>
+        <p:spPr/>
         <p:txBody>
           <a:bodyPr>
-            <a:normAutofit/>
+            <a:normAutofit lnSpcReduction="10000"/>
           </a:bodyPr>
           <a:lstStyle/>
           <a:p>
             <a:r>
-              <a:rPr lang="en-US" sz="6600" dirty="0"/>
-              <a:t>Question and Answer</a:t>
+              <a:rPr lang="en-US" sz="3600" dirty="0">
+                <a:solidFill>
+                  <a:schemeClr val="accent1"/>
+                </a:solidFill>
+              </a:rPr>
+              <a:t>Board – list of lists</a:t>
+            </a:r>
+          </a:p>
+          <a:p>
+            <a:r>
+              <a:rPr lang="en-US" sz="3600" dirty="0">
+                <a:solidFill>
+                  <a:schemeClr val="accent1"/>
+                </a:solidFill>
+              </a:rPr>
+              <a:t>Loop</a:t>
+            </a:r>
+          </a:p>
+          <a:p>
+            <a:pPr lvl="1"/>
+            <a:r>
+              <a:rPr lang="en-US" sz="3400" dirty="0">
+                <a:solidFill>
+                  <a:schemeClr val="accent1"/>
+                </a:solidFill>
+              </a:rPr>
+              <a:t>Prompt for command</a:t>
+            </a:r>
+          </a:p>
+          <a:p>
+            <a:pPr lvl="1"/>
+            <a:r>
+              <a:rPr lang="en-US" sz="3400" dirty="0">
+                <a:solidFill>
+                  <a:schemeClr val="accent1"/>
+                </a:solidFill>
+              </a:rPr>
+              <a:t>Check if command</a:t>
+            </a:r>
+          </a:p>
+          <a:p>
+            <a:pPr lvl="1"/>
+            <a:r>
+              <a:rPr lang="en-US" sz="3400" dirty="0">
+                <a:solidFill>
+                  <a:schemeClr val="accent1"/>
+                </a:solidFill>
+              </a:rPr>
+              <a:t>Check for bounds</a:t>
+            </a:r>
+          </a:p>
+          <a:p>
+            <a:pPr lvl="1"/>
+            <a:r>
+              <a:rPr lang="en-US" sz="3400" dirty="0">
+                <a:solidFill>
+                  <a:schemeClr val="accent1"/>
+                </a:solidFill>
+              </a:rPr>
+              <a:t>Update board</a:t>
             </a:r>
           </a:p>
         </p:txBody>
@@ -11638,7 +12415,7 @@
           <p:cNvPr id="4" name="Date Placeholder 3">
             <a:extLst>
               <a:ext uri="{FF2B5EF4-FFF2-40B4-BE49-F238E27FC236}">
-                <a16:creationId xmlns:a16="http://schemas.microsoft.com/office/drawing/2014/main" id="{B623EE2F-E3E9-437B-AFAE-1E0C5C94A5F8}"/>
+                <a16:creationId xmlns:a16="http://schemas.microsoft.com/office/drawing/2014/main" id="{38C80395-4C63-2725-13C8-6B43446350F9}"/>
               </a:ext>
             </a:extLst>
           </p:cNvPr>
@@ -11656,7 +12433,7 @@
           <a:p>
             <a:fld id="{A7119916-CD40-456D-ABE3-55F8822671F7}" type="datetime1">
               <a:rPr lang="en-US" smtClean="0"/>
-              <a:t>7/13/2022</a:t>
+              <a:t>8/9/2022</a:t>
             </a:fld>
             <a:endParaRPr lang="en-US" dirty="0"/>
           </a:p>
@@ -11667,7 +12444,7 @@
           <p:cNvPr id="5" name="Footer Placeholder 4">
             <a:extLst>
               <a:ext uri="{FF2B5EF4-FFF2-40B4-BE49-F238E27FC236}">
-                <a16:creationId xmlns:a16="http://schemas.microsoft.com/office/drawing/2014/main" id="{4E4D04EE-5AD0-4A57-A42E-AE62E411ACEA}"/>
+                <a16:creationId xmlns:a16="http://schemas.microsoft.com/office/drawing/2014/main" id="{957F1455-B056-EA38-021F-6F501EEF2F59}"/>
               </a:ext>
             </a:extLst>
           </p:cNvPr>
@@ -11684,15 +12461,10 @@
           <a:lstStyle/>
           <a:p>
             <a:r>
-              <a:rPr lang="en-US" dirty="0">
-                <a:hlinkClick r:id="rId3"/>
-              </a:rPr>
+              <a:rPr lang="en-US"/>
               <a:t>raysmith@alum.mit.edu</a:t>
             </a:r>
-            <a:r>
-              <a:rPr lang="en-US" dirty="0"/>
-              <a:t>	Session #4   Dictionaries	</a:t>
-            </a:r>
+            <a:endParaRPr lang="en-US" dirty="0"/>
           </a:p>
         </p:txBody>
       </p:sp>
@@ -11701,7 +12473,7 @@
           <p:cNvPr id="6" name="Slide Number Placeholder 5">
             <a:extLst>
               <a:ext uri="{FF2B5EF4-FFF2-40B4-BE49-F238E27FC236}">
-                <a16:creationId xmlns:a16="http://schemas.microsoft.com/office/drawing/2014/main" id="{9711C448-36A8-43E6-A891-6E42F22D1185}"/>
+                <a16:creationId xmlns:a16="http://schemas.microsoft.com/office/drawing/2014/main" id="{3CE43E15-E76E-7E52-38A0-A44D83174359}"/>
               </a:ext>
             </a:extLst>
           </p:cNvPr>
@@ -11728,7 +12500,7 @@
     </p:spTree>
     <p:extLst>
       <p:ext uri="{BB962C8B-B14F-4D97-AF65-F5344CB8AC3E}">
-        <p14:creationId xmlns:p14="http://schemas.microsoft.com/office/powerpoint/2010/main" val="3992011312"/>
+        <p14:creationId xmlns:p14="http://schemas.microsoft.com/office/powerpoint/2010/main" val="208075529"/>
       </p:ext>
     </p:extLst>
   </p:cSld>

</xml_diff>

<commit_message>
Update based on Sept 2022 class
</commit_message>
<xml_diff>
--- a/presentation/Class_4_Dictionaries/Class_4_Dictionaries.pptx
+++ b/presentation/Class_4_Dictionaries/Class_4_Dictionaries.pptx
@@ -207,7 +207,7 @@
           <a:p>
             <a:fld id="{7E78E4E2-C2CB-4D43-84EF-9F4E3E0E651C}" type="datetimeFigureOut">
               <a:rPr lang="en-US" smtClean="0"/>
-              <a:t>8/9/2022</a:t>
+              <a:t>10/4/2022</a:t>
             </a:fld>
             <a:endParaRPr lang="en-US" dirty="0"/>
           </a:p>
@@ -656,7 +656,7 @@
                 <a:tabLst/>
                 <a:defRPr/>
               </a:pPr>
-              <a:t>8/9/2022</a:t>
+              <a:t>10/4/2022</a:t>
             </a:fld>
             <a:endParaRPr kumimoji="0" lang="en-US" sz="1200" b="0" i="0" u="none" strike="noStrike" kern="1200" cap="none" spc="0" normalizeH="0" baseline="0" noProof="0" dirty="0">
               <a:ln>
@@ -996,7 +996,7 @@
                 <a:tabLst/>
                 <a:defRPr/>
               </a:pPr>
-              <a:t>8/9/2022</a:t>
+              <a:t>10/4/2022</a:t>
             </a:fld>
             <a:endParaRPr kumimoji="0" lang="en-US" sz="1200" b="0" i="0" u="none" strike="noStrike" kern="1200" cap="none" spc="0" normalizeH="0" baseline="0" noProof="0" dirty="0">
               <a:ln>
@@ -1330,7 +1330,7 @@
                 <a:tabLst/>
                 <a:defRPr/>
               </a:pPr>
-              <a:t>8/9/2022</a:t>
+              <a:t>10/4/2022</a:t>
             </a:fld>
             <a:endParaRPr kumimoji="0" lang="en-US" sz="1200" b="0" i="0" u="none" strike="noStrike" kern="1200" cap="none" spc="0" normalizeH="0" baseline="0" noProof="0" dirty="0">
               <a:ln>
@@ -1673,7 +1673,7 @@
                 <a:tabLst/>
                 <a:defRPr/>
               </a:pPr>
-              <a:t>8/9/2022</a:t>
+              <a:t>10/4/2022</a:t>
             </a:fld>
             <a:endParaRPr kumimoji="0" lang="en-US" sz="1200" b="0" i="0" u="none" strike="noStrike" kern="1200" cap="none" spc="0" normalizeH="0" baseline="0" noProof="0" dirty="0">
               <a:ln>
@@ -2007,7 +2007,7 @@
                 <a:tabLst/>
                 <a:defRPr/>
               </a:pPr>
-              <a:t>8/9/2022</a:t>
+              <a:t>10/4/2022</a:t>
             </a:fld>
             <a:endParaRPr kumimoji="0" lang="en-US" sz="1200" b="0" i="0" u="none" strike="noStrike" kern="1200" cap="none" spc="0" normalizeH="0" baseline="0" noProof="0" dirty="0">
               <a:ln>
@@ -2347,7 +2347,7 @@
                 <a:tabLst/>
                 <a:defRPr/>
               </a:pPr>
-              <a:t>8/9/2022</a:t>
+              <a:t>10/4/2022</a:t>
             </a:fld>
             <a:endParaRPr kumimoji="0" lang="en-US" sz="1200" b="0" i="0" u="none" strike="noStrike" kern="1200" cap="none" spc="0" normalizeH="0" baseline="0" noProof="0" dirty="0">
               <a:ln>
@@ -2619,7 +2619,7 @@
           <a:p>
             <a:fld id="{A596092B-28C7-44D1-B902-5437B333DFB7}" type="datetime1">
               <a:rPr lang="en-US" smtClean="0"/>
-              <a:t>8/9/2022</a:t>
+              <a:t>10/4/2022</a:t>
             </a:fld>
             <a:endParaRPr lang="en-US" dirty="0"/>
           </a:p>
@@ -3405,7 +3405,7 @@
           <a:p>
             <a:fld id="{B1DF5501-EE91-4443-9D3B-24E6F28D34E2}" type="datetime1">
               <a:rPr lang="en-US" smtClean="0"/>
-              <a:t>8/9/2022</a:t>
+              <a:t>10/4/2022</a:t>
             </a:fld>
             <a:endParaRPr lang="en-US" dirty="0"/>
           </a:p>
@@ -3671,7 +3671,7 @@
           <a:p>
             <a:fld id="{E954E1E9-8456-43AD-BA28-861520D256B9}" type="datetime1">
               <a:rPr lang="en-US" smtClean="0"/>
-              <a:t>8/9/2022</a:t>
+              <a:t>10/4/2022</a:t>
             </a:fld>
             <a:endParaRPr lang="en-US" dirty="0"/>
           </a:p>
@@ -3989,7 +3989,7 @@
           <a:p>
             <a:fld id="{FAF31E0C-AAFD-4E63-B3AE-16CD757951F4}" type="datetime1">
               <a:rPr lang="en-US" smtClean="0"/>
-              <a:t>8/9/2022</a:t>
+              <a:t>10/4/2022</a:t>
             </a:fld>
             <a:endParaRPr lang="en-US" dirty="0"/>
           </a:p>
@@ -4334,7 +4334,7 @@
           <a:p>
             <a:fld id="{000084FF-4715-4B6E-BD22-453621E5873F}" type="datetime1">
               <a:rPr lang="en-US" smtClean="0"/>
-              <a:t>8/9/2022</a:t>
+              <a:t>10/4/2022</a:t>
             </a:fld>
             <a:endParaRPr lang="en-US" dirty="0"/>
           </a:p>
@@ -4652,7 +4652,7 @@
           <a:p>
             <a:fld id="{6AC37F8D-4DF5-4AB6-A766-5A84B3D74A3B}" type="datetime1">
               <a:rPr lang="en-US" smtClean="0"/>
-              <a:t>8/9/2022</a:t>
+              <a:t>10/4/2022</a:t>
             </a:fld>
             <a:endParaRPr lang="en-US" dirty="0"/>
           </a:p>
@@ -5049,7 +5049,7 @@
           <a:p>
             <a:fld id="{1BF3CD1A-162D-40B2-9B22-9056F77C27F2}" type="datetime1">
               <a:rPr lang="en-US" smtClean="0"/>
-              <a:t>8/9/2022</a:t>
+              <a:t>10/4/2022</a:t>
             </a:fld>
             <a:endParaRPr lang="en-US" dirty="0"/>
           </a:p>
@@ -5223,7 +5223,7 @@
           <a:p>
             <a:fld id="{D42E4200-B1E5-4E39-8279-05DD69810A37}" type="datetime1">
               <a:rPr lang="en-US" smtClean="0"/>
-              <a:t>8/9/2022</a:t>
+              <a:t>10/4/2022</a:t>
             </a:fld>
             <a:endParaRPr lang="en-US" dirty="0"/>
           </a:p>
@@ -5406,7 +5406,7 @@
           <a:p>
             <a:fld id="{47CF7895-00AC-42E5-9790-7B0E3CE09DF2}" type="datetime1">
               <a:rPr lang="en-US" smtClean="0"/>
-              <a:t>8/9/2022</a:t>
+              <a:t>10/4/2022</a:t>
             </a:fld>
             <a:endParaRPr lang="en-US" dirty="0"/>
           </a:p>
@@ -5585,7 +5585,7 @@
           <a:p>
             <a:fld id="{A7119916-CD40-456D-ABE3-55F8822671F7}" type="datetime1">
               <a:rPr lang="en-US" smtClean="0"/>
-              <a:t>8/9/2022</a:t>
+              <a:t>10/4/2022</a:t>
             </a:fld>
             <a:endParaRPr lang="en-US" dirty="0"/>
           </a:p>
@@ -5835,7 +5835,7 @@
           <a:p>
             <a:fld id="{3F9A13D6-B8C2-463B-B3F7-C62E098B328E}" type="datetime1">
               <a:rPr lang="en-US" smtClean="0"/>
-              <a:t>8/9/2022</a:t>
+              <a:t>10/4/2022</a:t>
             </a:fld>
             <a:endParaRPr lang="en-US" dirty="0"/>
           </a:p>
@@ -6070,7 +6070,7 @@
           <a:p>
             <a:fld id="{D2B63420-31EE-4E4B-911C-2601B14D9FDD}" type="datetime1">
               <a:rPr lang="en-US" smtClean="0"/>
-              <a:t>8/9/2022</a:t>
+              <a:t>10/4/2022</a:t>
             </a:fld>
             <a:endParaRPr lang="en-US" dirty="0"/>
           </a:p>
@@ -6447,7 +6447,7 @@
           <a:p>
             <a:fld id="{2DD8986D-86F8-41E6-8CFF-8C91AEF92622}" type="datetime1">
               <a:rPr lang="en-US" smtClean="0"/>
-              <a:t>8/9/2022</a:t>
+              <a:t>10/4/2022</a:t>
             </a:fld>
             <a:endParaRPr lang="en-US" dirty="0"/>
           </a:p>
@@ -6573,7 +6573,7 @@
           <a:p>
             <a:fld id="{BA885161-032E-4C6A-8EDA-39D168DF18E4}" type="datetime1">
               <a:rPr lang="en-US" smtClean="0"/>
-              <a:t>8/9/2022</a:t>
+              <a:t>10/4/2022</a:t>
             </a:fld>
             <a:endParaRPr lang="en-US" dirty="0"/>
           </a:p>
@@ -6671,7 +6671,7 @@
           <a:p>
             <a:fld id="{958E6740-E523-48D9-9C4E-6F218E87BAF3}" type="datetime1">
               <a:rPr lang="en-US" smtClean="0"/>
-              <a:t>8/9/2022</a:t>
+              <a:t>10/4/2022</a:t>
             </a:fld>
             <a:endParaRPr lang="en-US" dirty="0"/>
           </a:p>
@@ -6929,7 +6929,7 @@
           <a:p>
             <a:fld id="{6121D4CA-FF09-4CB8-8D51-2613D19A0F2E}" type="datetime1">
               <a:rPr lang="en-US" smtClean="0"/>
-              <a:t>8/9/2022</a:t>
+              <a:t>10/4/2022</a:t>
             </a:fld>
             <a:endParaRPr lang="en-US" dirty="0"/>
           </a:p>
@@ -7194,7 +7194,7 @@
           <a:p>
             <a:fld id="{8C4779EA-AEA7-43B3-9B65-A77E9A890421}" type="datetime1">
               <a:rPr lang="en-US" smtClean="0"/>
-              <a:t>8/9/2022</a:t>
+              <a:t>10/4/2022</a:t>
             </a:fld>
             <a:endParaRPr lang="en-US" dirty="0"/>
           </a:p>
@@ -7940,7 +7940,7 @@
           <a:p>
             <a:fld id="{059A67F1-3EA0-4026-BE6A-31EE4E1B1DB5}" type="datetime1">
               <a:rPr lang="en-US" smtClean="0"/>
-              <a:t>8/9/2022</a:t>
+              <a:t>10/4/2022</a:t>
             </a:fld>
             <a:endParaRPr lang="en-US" dirty="0"/>
           </a:p>
@@ -8675,7 +8675,7 @@
                 <a:tabLst/>
                 <a:defRPr/>
               </a:pPr>
-              <a:t>8/9/2022</a:t>
+              <a:t>10/4/2022</a:t>
             </a:fld>
             <a:endParaRPr kumimoji="0" lang="en-US" sz="900" b="0" i="0" u="none" strike="noStrike" kern="1200" cap="none" spc="0" normalizeH="0" baseline="0" noProof="0" dirty="0">
               <a:ln>
@@ -9089,7 +9089,7 @@
           <a:p>
             <a:fld id="{A7119916-CD40-456D-ABE3-55F8822671F7}" type="datetime1">
               <a:rPr lang="en-US" smtClean="0"/>
-              <a:t>8/9/2022</a:t>
+              <a:t>10/4/2022</a:t>
             </a:fld>
             <a:endParaRPr lang="en-US" dirty="0"/>
           </a:p>
@@ -9254,7 +9254,7 @@
           <a:p>
             <a:fld id="{A7119916-CD40-456D-ABE3-55F8822671F7}" type="datetime1">
               <a:rPr lang="en-US" smtClean="0"/>
-              <a:t>8/9/2022</a:t>
+              <a:t>10/4/2022</a:t>
             </a:fld>
             <a:endParaRPr lang="en-US" dirty="0"/>
           </a:p>
@@ -9416,6 +9416,13 @@
               <a:t>fireworks.py</a:t>
             </a:r>
           </a:p>
+          <a:p>
+            <a:pPr lvl="1"/>
+            <a:r>
+              <a:rPr lang="en-US" sz="3400" dirty="0"/>
+              <a:t>Common starting points window, colors, size</a:t>
+            </a:r>
+          </a:p>
         </p:txBody>
       </p:sp>
       <p:sp>
@@ -9441,7 +9448,7 @@
           <a:p>
             <a:fld id="{A7119916-CD40-456D-ABE3-55F8822671F7}" type="datetime1">
               <a:rPr lang="en-US" smtClean="0"/>
-              <a:t>8/9/2022</a:t>
+              <a:t>10/4/2022</a:t>
             </a:fld>
             <a:endParaRPr lang="en-US" dirty="0"/>
           </a:p>
@@ -9740,7 +9747,7 @@
                 <a:tabLst/>
                 <a:defRPr/>
               </a:pPr>
-              <a:t>8/9/2022</a:t>
+              <a:t>10/4/2022</a:t>
             </a:fld>
             <a:endParaRPr kumimoji="0" lang="en-US" sz="900" b="0" i="0" u="none" strike="noStrike" kern="1200" cap="none" spc="0" normalizeH="0" baseline="0" noProof="0" dirty="0">
               <a:ln>
@@ -10073,7 +10080,7 @@
                 <a:latin typeface="+mj-lt"/>
                 <a:cs typeface="Courier New" panose="02070309020205020404" pitchFamily="49" charset="0"/>
               </a:rPr>
-              <a:t>key1=val1, </a:t>
+              <a:t>key1:val1, </a:t>
             </a:r>
             <a:r>
               <a:rPr lang="en-US" sz="4000" b="1" dirty="0">
@@ -10109,15 +10116,7 @@
             </a:r>
             <a:r>
               <a:rPr lang="en-US" sz="4000" dirty="0"/>
-              <a:t>	v = di[key]			v = li[</a:t>
-            </a:r>
-            <a:r>
-              <a:rPr lang="en-US" sz="4000" dirty="0" err="1"/>
-              <a:t>indx</a:t>
-            </a:r>
-            <a:r>
-              <a:rPr lang="en-US" sz="4000" dirty="0"/>
-              <a:t>]</a:t>
+              <a:t>	v = di[key]			v = li[index]</a:t>
             </a:r>
           </a:p>
           <a:p>
@@ -10140,15 +10139,7 @@
             </a:r>
             <a:r>
               <a:rPr lang="en-US" sz="4000" dirty="0"/>
-              <a:t>			li[</a:t>
-            </a:r>
-            <a:r>
-              <a:rPr lang="en-US" sz="4000" dirty="0" err="1"/>
-              <a:t>indx</a:t>
-            </a:r>
-            <a:r>
-              <a:rPr lang="en-US" sz="4000" dirty="0"/>
-              <a:t>] = </a:t>
+              <a:t>			li[index] = </a:t>
             </a:r>
             <a:r>
               <a:rPr lang="en-US" sz="4000" dirty="0" err="1"/>
@@ -10319,7 +10310,7 @@
           <a:p>
             <a:fld id="{A7119916-CD40-456D-ABE3-55F8822671F7}" type="datetime1">
               <a:rPr lang="en-US" smtClean="0"/>
-              <a:t>8/9/2022</a:t>
+              <a:t>10/4/2022</a:t>
             </a:fld>
             <a:endParaRPr lang="en-US" dirty="0"/>
           </a:p>
@@ -10625,7 +10616,7 @@
                 <a:tabLst/>
                 <a:defRPr/>
               </a:pPr>
-              <a:t>8/9/2022</a:t>
+              <a:t>10/4/2022</a:t>
             </a:fld>
             <a:endParaRPr kumimoji="0" lang="en-US" sz="900" b="0" i="0" u="none" strike="noStrike" kern="1200" cap="none" spc="0" normalizeH="0" baseline="0" noProof="0" dirty="0">
               <a:ln>
@@ -11124,7 +11115,7 @@
                 <a:tabLst/>
                 <a:defRPr/>
               </a:pPr>
-              <a:t>8/9/2022</a:t>
+              <a:t>10/4/2022</a:t>
             </a:fld>
             <a:endParaRPr kumimoji="0" lang="en-US" sz="900" b="0" i="0" u="none" strike="noStrike" kern="1200" cap="none" spc="0" normalizeH="0" baseline="0" noProof="0" dirty="0">
               <a:ln>
@@ -11578,7 +11569,7 @@
                 <a:tabLst/>
                 <a:defRPr/>
               </a:pPr>
-              <a:t>8/9/2022</a:t>
+              <a:t>10/4/2022</a:t>
             </a:fld>
             <a:endParaRPr kumimoji="0" lang="en-US" sz="900" b="0" i="0" u="none" strike="noStrike" kern="1200" cap="none" spc="0" normalizeH="0" baseline="0" noProof="0" dirty="0">
               <a:ln>
@@ -11882,7 +11873,7 @@
                 <a:latin typeface="Courier New" panose="02070309020205020404" pitchFamily="49" charset="0"/>
                 <a:cs typeface="Courier New" panose="02070309020205020404" pitchFamily="49" charset="0"/>
               </a:rPr>
-              <a:t>exercises/dictionaries/motion.py</a:t>
+              <a:t>exercises/files/dictionaries/motion.py</a:t>
             </a:r>
           </a:p>
           <a:p>
@@ -11924,27 +11915,8 @@
                 <a:ea typeface="Tahoma" panose="020B0604030504040204" pitchFamily="34" charset="0"/>
                 <a:cs typeface="Tahoma" panose="020B0604030504040204" pitchFamily="34" charset="0"/>
               </a:rPr>
-              <a:t>Field updated </a:t>
-            </a:r>
-            <a:r>
-              <a:rPr lang="en-US" sz="3200">
-                <a:solidFill>
-                  <a:schemeClr val="accent1"/>
-                </a:solidFill>
-                <a:latin typeface="Tahoma" panose="020B0604030504040204" pitchFamily="34" charset="0"/>
-                <a:ea typeface="Tahoma" panose="020B0604030504040204" pitchFamily="34" charset="0"/>
-                <a:cs typeface="Tahoma" panose="020B0604030504040204" pitchFamily="34" charset="0"/>
-              </a:rPr>
-              <a:t>each move</a:t>
-            </a:r>
-            <a:endParaRPr lang="en-US" sz="3200" dirty="0">
-              <a:solidFill>
-                <a:schemeClr val="accent1"/>
-              </a:solidFill>
-              <a:latin typeface="Tahoma" panose="020B0604030504040204" pitchFamily="34" charset="0"/>
-              <a:ea typeface="Tahoma" panose="020B0604030504040204" pitchFamily="34" charset="0"/>
-              <a:cs typeface="Tahoma" panose="020B0604030504040204" pitchFamily="34" charset="0"/>
-            </a:endParaRPr>
+              <a:t>Field updated each move</a:t>
+            </a:r>
           </a:p>
           <a:p>
             <a:pPr marL="857250" lvl="1" indent="-457200"/>
@@ -12045,7 +12017,7 @@
                 <a:tabLst/>
                 <a:defRPr/>
               </a:pPr>
-              <a:t>8/9/2022</a:t>
+              <a:t>10/4/2022</a:t>
             </a:fld>
             <a:endParaRPr kumimoji="0" lang="en-US" sz="900" b="0" i="0" u="none" strike="noStrike" kern="1200" cap="none" spc="0" normalizeH="0" baseline="0" noProof="0" dirty="0">
               <a:ln>
@@ -12433,7 +12405,7 @@
           <a:p>
             <a:fld id="{A7119916-CD40-456D-ABE3-55F8822671F7}" type="datetime1">
               <a:rPr lang="en-US" smtClean="0"/>
-              <a:t>8/9/2022</a:t>
+              <a:t>10/4/2022</a:t>
             </a:fld>
             <a:endParaRPr lang="en-US" dirty="0"/>
           </a:p>

</xml_diff>